<commit_message>
removed old web application
</commit_message>
<xml_diff>
--- a/docs/ETU DIT #2.pptx
+++ b/docs/ETU DIT #2.pptx
@@ -4062,17 +4062,15 @@
         </p:nvSpPr>
         <p:spPr>
           <a:xfrm>
-            <a:off x="599040" y="301320"/>
-            <a:ext cx="10798200" cy="1261800"/>
-          </a:xfrm>
-          <a:prstGeom prst="rect">
-            <a:avLst/>
-          </a:prstGeom>
-        </p:spPr>
-        <p:txBody>
-          <a:bodyPr lIns="0" rIns="0" tIns="0" bIns="0" anchor="ctr">
-            <a:normAutofit/>
-          </a:bodyPr>
+            <a:off x="599760" y="301320"/>
+            <a:ext cx="10797840" cy="1261440"/>
+          </a:xfrm>
+          <a:prstGeom prst="rect">
+            <a:avLst/>
+          </a:prstGeom>
+        </p:spPr>
+        <p:txBody>
+          <a:bodyPr lIns="0" rIns="0" tIns="0" bIns="0" anchor="ctr"/>
           <a:p>
             <a:r>
               <a:rPr b="0" lang="ru-RU" sz="1800" spc="-1" strike="noStrike">
@@ -4099,7 +4097,7 @@
         <p:spPr>
           <a:xfrm>
             <a:off x="599760" y="1768680"/>
-            <a:ext cx="10798200" cy="4384080"/>
+            <a:ext cx="10797840" cy="4383720"/>
           </a:xfrm>
           <a:prstGeom prst="rect">
             <a:avLst/>
@@ -4122,12 +4120,12 @@
               <a:buChar char=""/>
             </a:pPr>
             <a:r>
-              <a:rPr b="0" lang="ru-RU" sz="3200" spc="-1" strike="noStrike">
+              <a:rPr b="0" lang="ru-RU" sz="1800" spc="-1" strike="noStrike">
                 <a:latin typeface="Arial"/>
               </a:rPr>
               <a:t>Для правки структуры щёлкните мышью</a:t>
             </a:r>
-            <a:endParaRPr b="0" lang="ru-RU" sz="3200" spc="-1" strike="noStrike">
+            <a:endParaRPr b="0" lang="ru-RU" sz="1800" spc="-1" strike="noStrike">
               <a:latin typeface="Arial"/>
             </a:endParaRPr>
           </a:p>
@@ -4144,12 +4142,12 @@
               <a:buChar char=""/>
             </a:pPr>
             <a:r>
-              <a:rPr b="0" lang="ru-RU" sz="2800" spc="-1" strike="noStrike">
+              <a:rPr b="0" lang="ru-RU" sz="1800" spc="-1" strike="noStrike">
                 <a:latin typeface="Arial"/>
               </a:rPr>
               <a:t>Второй уровень структуры</a:t>
             </a:r>
-            <a:endParaRPr b="0" lang="ru-RU" sz="2800" spc="-1" strike="noStrike">
+            <a:endParaRPr b="0" lang="ru-RU" sz="1800" spc="-1" strike="noStrike">
               <a:latin typeface="Arial"/>
             </a:endParaRPr>
           </a:p>
@@ -4166,12 +4164,12 @@
               <a:buChar char=""/>
             </a:pPr>
             <a:r>
-              <a:rPr b="0" lang="ru-RU" sz="2400" spc="-1" strike="noStrike">
+              <a:rPr b="0" lang="ru-RU" sz="1800" spc="-1" strike="noStrike">
                 <a:latin typeface="Arial"/>
               </a:rPr>
               <a:t>Третий уровень структуры</a:t>
             </a:r>
-            <a:endParaRPr b="0" lang="ru-RU" sz="2400" spc="-1" strike="noStrike">
+            <a:endParaRPr b="0" lang="ru-RU" sz="1800" spc="-1" strike="noStrike">
               <a:latin typeface="Arial"/>
             </a:endParaRPr>
           </a:p>
@@ -4188,12 +4186,12 @@
               <a:buChar char=""/>
             </a:pPr>
             <a:r>
-              <a:rPr b="0" lang="ru-RU" sz="2000" spc="-1" strike="noStrike">
+              <a:rPr b="0" lang="ru-RU" sz="1800" spc="-1" strike="noStrike">
                 <a:latin typeface="Arial"/>
               </a:rPr>
               <a:t>Четвёртый уровень структуры</a:t>
             </a:r>
-            <a:endParaRPr b="0" lang="ru-RU" sz="2000" spc="-1" strike="noStrike">
+            <a:endParaRPr b="0" lang="ru-RU" sz="1800" spc="-1" strike="noStrike">
               <a:latin typeface="Arial"/>
             </a:endParaRPr>
           </a:p>
@@ -4210,12 +4208,12 @@
               <a:buChar char=""/>
             </a:pPr>
             <a:r>
-              <a:rPr b="0" lang="ru-RU" sz="2000" spc="-1" strike="noStrike">
+              <a:rPr b="0" lang="ru-RU" sz="1800" spc="-1" strike="noStrike">
                 <a:latin typeface="Arial"/>
               </a:rPr>
               <a:t>Пятый уровень структуры</a:t>
             </a:r>
-            <a:endParaRPr b="0" lang="ru-RU" sz="2000" spc="-1" strike="noStrike">
+            <a:endParaRPr b="0" lang="ru-RU" sz="1800" spc="-1" strike="noStrike">
               <a:latin typeface="Arial"/>
             </a:endParaRPr>
           </a:p>
@@ -4232,12 +4230,12 @@
               <a:buChar char=""/>
             </a:pPr>
             <a:r>
-              <a:rPr b="0" lang="ru-RU" sz="2000" spc="-1" strike="noStrike">
+              <a:rPr b="0" lang="ru-RU" sz="1800" spc="-1" strike="noStrike">
                 <a:latin typeface="Arial"/>
               </a:rPr>
               <a:t>Шестой уровень структуры</a:t>
             </a:r>
-            <a:endParaRPr b="0" lang="ru-RU" sz="2000" spc="-1" strike="noStrike">
+            <a:endParaRPr b="0" lang="ru-RU" sz="1800" spc="-1" strike="noStrike">
               <a:latin typeface="Arial"/>
             </a:endParaRPr>
           </a:p>
@@ -4254,12 +4252,12 @@
               <a:buChar char=""/>
             </a:pPr>
             <a:r>
-              <a:rPr b="0" lang="ru-RU" sz="2000" spc="-1" strike="noStrike">
+              <a:rPr b="0" lang="ru-RU" sz="1800" spc="-1" strike="noStrike">
                 <a:latin typeface="Arial"/>
               </a:rPr>
               <a:t>Седьмой уровень структуры</a:t>
             </a:r>
-            <a:endParaRPr b="0" lang="ru-RU" sz="2000" spc="-1" strike="noStrike">
+            <a:endParaRPr b="0" lang="ru-RU" sz="1800" spc="-1" strike="noStrike">
               <a:latin typeface="Arial"/>
             </a:endParaRPr>
           </a:p>
@@ -4324,7 +4322,7 @@
         </p:nvSpPr>
         <p:spPr>
           <a:xfrm>
-            <a:off x="599040" y="301320"/>
+            <a:off x="599760" y="301320"/>
             <a:ext cx="10798200" cy="1261800"/>
           </a:xfrm>
           <a:prstGeom prst="rect">
@@ -4332,17 +4330,16 @@
           </a:prstGeom>
         </p:spPr>
         <p:txBody>
-          <a:bodyPr lIns="0" rIns="0" tIns="0" bIns="0" anchor="ctr">
-            <a:normAutofit/>
-          </a:bodyPr>
-          <a:p>
-            <a:r>
-              <a:rPr b="0" lang="ru-RU" sz="1800" spc="-1" strike="noStrike">
+          <a:bodyPr lIns="0" rIns="0" tIns="0" bIns="0" anchor="ctr"/>
+          <a:p>
+            <a:pPr algn="ctr"/>
+            <a:r>
+              <a:rPr b="0" lang="ru-RU" sz="4400" spc="-1" strike="noStrike">
                 <a:latin typeface="Arial"/>
               </a:rPr>
               <a:t>Для правки текста заглавия щёлкните мышью</a:t>
             </a:r>
-            <a:endParaRPr b="0" lang="ru-RU" sz="1800" spc="-1" strike="noStrike">
+            <a:endParaRPr b="0" lang="ru-RU" sz="4400" spc="-1" strike="noStrike">
               <a:latin typeface="Arial"/>
             </a:endParaRPr>
           </a:p>
@@ -4360,8 +4357,8 @@
         </p:nvSpPr>
         <p:spPr>
           <a:xfrm>
-            <a:off x="599040" y="1828800"/>
-            <a:ext cx="10830600" cy="5394600"/>
+            <a:off x="599760" y="1768680"/>
+            <a:ext cx="10798200" cy="4384080"/>
           </a:xfrm>
           <a:prstGeom prst="rect">
             <a:avLst/>
@@ -4384,12 +4381,12 @@
               <a:buChar char=""/>
             </a:pPr>
             <a:r>
-              <a:rPr b="0" lang="ru-RU" sz="1800" spc="-1" strike="noStrike">
+              <a:rPr b="0" lang="ru-RU" sz="3200" spc="-1" strike="noStrike">
                 <a:latin typeface="Arial"/>
               </a:rPr>
               <a:t>Для правки структуры щёлкните мышью</a:t>
             </a:r>
-            <a:endParaRPr b="0" lang="ru-RU" sz="1800" spc="-1" strike="noStrike">
+            <a:endParaRPr b="0" lang="ru-RU" sz="3200" spc="-1" strike="noStrike">
               <a:latin typeface="Arial"/>
             </a:endParaRPr>
           </a:p>
@@ -4406,12 +4403,12 @@
               <a:buChar char=""/>
             </a:pPr>
             <a:r>
-              <a:rPr b="0" lang="ru-RU" sz="1800" spc="-1" strike="noStrike">
+              <a:rPr b="0" lang="ru-RU" sz="2800" spc="-1" strike="noStrike">
                 <a:latin typeface="Arial"/>
               </a:rPr>
               <a:t>Второй уровень структуры</a:t>
             </a:r>
-            <a:endParaRPr b="0" lang="ru-RU" sz="1800" spc="-1" strike="noStrike">
+            <a:endParaRPr b="0" lang="ru-RU" sz="2800" spc="-1" strike="noStrike">
               <a:latin typeface="Arial"/>
             </a:endParaRPr>
           </a:p>
@@ -4428,12 +4425,12 @@
               <a:buChar char=""/>
             </a:pPr>
             <a:r>
-              <a:rPr b="0" lang="ru-RU" sz="1800" spc="-1" strike="noStrike">
+              <a:rPr b="0" lang="ru-RU" sz="2400" spc="-1" strike="noStrike">
                 <a:latin typeface="Arial"/>
               </a:rPr>
               <a:t>Третий уровень структуры</a:t>
             </a:r>
-            <a:endParaRPr b="0" lang="ru-RU" sz="1800" spc="-1" strike="noStrike">
+            <a:endParaRPr b="0" lang="ru-RU" sz="2400" spc="-1" strike="noStrike">
               <a:latin typeface="Arial"/>
             </a:endParaRPr>
           </a:p>
@@ -4450,12 +4447,12 @@
               <a:buChar char=""/>
             </a:pPr>
             <a:r>
-              <a:rPr b="0" lang="ru-RU" sz="1800" spc="-1" strike="noStrike">
+              <a:rPr b="0" lang="ru-RU" sz="2000" spc="-1" strike="noStrike">
                 <a:latin typeface="Arial"/>
               </a:rPr>
               <a:t>Четвёртый уровень структуры</a:t>
             </a:r>
-            <a:endParaRPr b="0" lang="ru-RU" sz="1800" spc="-1" strike="noStrike">
+            <a:endParaRPr b="0" lang="ru-RU" sz="2000" spc="-1" strike="noStrike">
               <a:latin typeface="Arial"/>
             </a:endParaRPr>
           </a:p>
@@ -4472,12 +4469,12 @@
               <a:buChar char=""/>
             </a:pPr>
             <a:r>
-              <a:rPr b="0" lang="ru-RU" sz="1800" spc="-1" strike="noStrike">
+              <a:rPr b="0" lang="ru-RU" sz="2000" spc="-1" strike="noStrike">
                 <a:latin typeface="Arial"/>
               </a:rPr>
               <a:t>Пятый уровень структуры</a:t>
             </a:r>
-            <a:endParaRPr b="0" lang="ru-RU" sz="1800" spc="-1" strike="noStrike">
+            <a:endParaRPr b="0" lang="ru-RU" sz="2000" spc="-1" strike="noStrike">
               <a:latin typeface="Arial"/>
             </a:endParaRPr>
           </a:p>
@@ -4494,12 +4491,12 @@
               <a:buChar char=""/>
             </a:pPr>
             <a:r>
-              <a:rPr b="0" lang="ru-RU" sz="1800" spc="-1" strike="noStrike">
+              <a:rPr b="0" lang="ru-RU" sz="2000" spc="-1" strike="noStrike">
                 <a:latin typeface="Arial"/>
               </a:rPr>
               <a:t>Шестой уровень структуры</a:t>
             </a:r>
-            <a:endParaRPr b="0" lang="ru-RU" sz="1800" spc="-1" strike="noStrike">
+            <a:endParaRPr b="0" lang="ru-RU" sz="2000" spc="-1" strike="noStrike">
               <a:latin typeface="Arial"/>
             </a:endParaRPr>
           </a:p>
@@ -4516,12 +4513,12 @@
               <a:buChar char=""/>
             </a:pPr>
             <a:r>
-              <a:rPr b="0" lang="ru-RU" sz="1800" spc="-1" strike="noStrike">
+              <a:rPr b="0" lang="ru-RU" sz="2000" spc="-1" strike="noStrike">
                 <a:latin typeface="Arial"/>
               </a:rPr>
               <a:t>Седьмой уровень структуры</a:t>
             </a:r>
-            <a:endParaRPr b="0" lang="ru-RU" sz="1800" spc="-1" strike="noStrike">
+            <a:endParaRPr b="0" lang="ru-RU" sz="2000" spc="-1" strike="noStrike">
               <a:latin typeface="Arial"/>
             </a:endParaRPr>
           </a:p>
@@ -4834,7 +4831,7 @@
         <p:spPr>
           <a:xfrm>
             <a:off x="548640" y="301320"/>
-            <a:ext cx="10798200" cy="4453200"/>
+            <a:ext cx="10797840" cy="4452840"/>
           </a:xfrm>
           <a:prstGeom prst="rect">
             <a:avLst/>
@@ -4861,6 +4858,7 @@
                   <a:srgbClr val="04617b"/>
                 </a:solidFill>
                 <a:latin typeface="Source Sans Pro Light"/>
+                <a:ea typeface="DejaVu Sans"/>
               </a:rPr>
               <a:t>Инструментальные средства программирования</a:t>
             </a:r>
@@ -4879,7 +4877,7 @@
         <p:spPr>
           <a:xfrm>
             <a:off x="552960" y="5216400"/>
-            <a:ext cx="10789560" cy="1549800"/>
+            <a:ext cx="10789200" cy="1549440"/>
           </a:xfrm>
           <a:prstGeom prst="rect">
             <a:avLst/>
@@ -4904,6 +4902,7 @@
                   <a:srgbClr val="dbf5f9"/>
                 </a:solidFill>
                 <a:latin typeface="Source Sans Pro"/>
+                <a:ea typeface="DejaVu Sans"/>
               </a:rPr>
               <a:t>Лекция 2. Тестирование и анализ кода</a:t>
             </a:r>
@@ -4918,6 +4917,7 @@
                   <a:srgbClr val="dbf5f9"/>
                 </a:solidFill>
                 <a:latin typeface="Source Sans Pro"/>
+                <a:ea typeface="DejaVu Sans"/>
               </a:rPr>
               <a:t>Пешехонов К. А., 08.10.2018</a:t>
             </a:r>
@@ -4985,7 +4985,7 @@
         <p:spPr>
           <a:xfrm>
             <a:off x="599040" y="121320"/>
-            <a:ext cx="10798200" cy="1261800"/>
+            <a:ext cx="10797840" cy="1261440"/>
           </a:xfrm>
           <a:prstGeom prst="rect">
             <a:avLst/>
@@ -5012,6 +5012,7 @@
                   <a:srgbClr val="ffffff"/>
                 </a:solidFill>
                 <a:latin typeface="Source Sans Pro Light"/>
+                <a:ea typeface="DejaVu Sans"/>
               </a:rPr>
               <a:t>Статический анализ vs code review</a:t>
             </a:r>
@@ -5030,7 +5031,7 @@
         <p:spPr>
           <a:xfrm>
             <a:off x="504000" y="1888920"/>
-            <a:ext cx="4248000" cy="4951080"/>
+            <a:ext cx="4247640" cy="4950720"/>
           </a:xfrm>
           <a:prstGeom prst="rect">
             <a:avLst/>
@@ -5051,7 +5052,7 @@
             <a:normAutofit/>
           </a:bodyPr>
           <a:p>
-            <a:pPr marL="432000" indent="-323640">
+            <a:pPr marL="432000" indent="-323280">
               <a:lnSpc>
                 <a:spcPct val="100000"/>
               </a:lnSpc>
@@ -5067,7 +5068,11 @@
             </a:pPr>
             <a:r>
               <a:rPr b="0" lang="ru-RU" sz="3200" spc="-1" strike="noStrike">
+                <a:solidFill>
+                  <a:srgbClr val="000000"/>
+                </a:solidFill>
                 <a:latin typeface="Source Sans Pro"/>
+                <a:ea typeface="DejaVu Sans"/>
               </a:rPr>
               <a:t>Code Review — проверяет, что код написан так, как это считает правильным проверяющий (в идеале, в соответствии с принятыми практиками кодирования)</a:t>
             </a:r>
@@ -5076,7 +5081,7 @@
             </a:endParaRPr>
           </a:p>
           <a:p>
-            <a:pPr marL="432000" indent="-323640">
+            <a:pPr marL="432000" indent="-323280">
               <a:lnSpc>
                 <a:spcPct val="100000"/>
               </a:lnSpc>
@@ -5092,7 +5097,11 @@
             </a:pPr>
             <a:r>
               <a:rPr b="0" lang="ru-RU" sz="3200" spc="-1" strike="noStrike">
+                <a:solidFill>
+                  <a:srgbClr val="000000"/>
+                </a:solidFill>
                 <a:latin typeface="Source Sans Pro"/>
+                <a:ea typeface="DejaVu Sans"/>
               </a:rPr>
               <a:t>Статический анализ — проверяет, что код не нарушает набор правил, проверяемые автоматической системой</a:t>
             </a:r>
@@ -5115,7 +5124,7 @@
         <p:spPr>
           <a:xfrm>
             <a:off x="5040000" y="1924200"/>
-            <a:ext cx="6310440" cy="4968000"/>
+            <a:ext cx="6310080" cy="4967640"/>
           </a:xfrm>
           <a:prstGeom prst="rect">
             <a:avLst/>
@@ -5183,7 +5192,7 @@
         <p:spPr>
           <a:xfrm>
             <a:off x="599040" y="121320"/>
-            <a:ext cx="10798200" cy="1261800"/>
+            <a:ext cx="10797840" cy="1261440"/>
           </a:xfrm>
           <a:prstGeom prst="rect">
             <a:avLst/>
@@ -5210,6 +5219,7 @@
                   <a:srgbClr val="ffffff"/>
                 </a:solidFill>
                 <a:latin typeface="Source Sans Pro Light"/>
+                <a:ea typeface="DejaVu Sans"/>
               </a:rPr>
               <a:t>Польза статического анализа</a:t>
             </a:r>
@@ -5228,7 +5238,7 @@
         <p:spPr>
           <a:xfrm>
             <a:off x="504000" y="1888920"/>
-            <a:ext cx="11088000" cy="5023080"/>
+            <a:ext cx="11087640" cy="5022720"/>
           </a:xfrm>
           <a:prstGeom prst="rect">
             <a:avLst/>
@@ -5249,7 +5259,7 @@
             <a:normAutofit/>
           </a:bodyPr>
           <a:p>
-            <a:pPr marL="432000" indent="-323640">
+            <a:pPr marL="432000" indent="-323280">
               <a:lnSpc>
                 <a:spcPct val="100000"/>
               </a:lnSpc>
@@ -5265,7 +5275,11 @@
             </a:pPr>
             <a:r>
               <a:rPr b="0" lang="ru-RU" sz="3200" spc="-1" strike="noStrike">
+                <a:solidFill>
+                  <a:srgbClr val="000000"/>
+                </a:solidFill>
                 <a:latin typeface="Source Sans Pro"/>
+                <a:ea typeface="DejaVu Sans"/>
               </a:rPr>
               <a:t>Автоматизированный запуск в рамках тестирования нового кода</a:t>
             </a:r>
@@ -5274,7 +5288,7 @@
             </a:endParaRPr>
           </a:p>
           <a:p>
-            <a:pPr marL="432000" indent="-323640">
+            <a:pPr marL="432000" indent="-323280">
               <a:lnSpc>
                 <a:spcPct val="100000"/>
               </a:lnSpc>
@@ -5290,7 +5304,11 @@
             </a:pPr>
             <a:r>
               <a:rPr b="0" lang="ru-RU" sz="3200" spc="-1" strike="noStrike">
+                <a:solidFill>
+                  <a:srgbClr val="000000"/>
+                </a:solidFill>
                 <a:latin typeface="Source Sans Pro"/>
+                <a:ea typeface="DejaVu Sans"/>
               </a:rPr>
               <a:t>Интеграция в IDE/CI</a:t>
             </a:r>
@@ -5299,7 +5317,7 @@
             </a:endParaRPr>
           </a:p>
           <a:p>
-            <a:pPr marL="432000" indent="-323640">
+            <a:pPr marL="432000" indent="-323280">
               <a:lnSpc>
                 <a:spcPct val="100000"/>
               </a:lnSpc>
@@ -5315,7 +5333,11 @@
             </a:pPr>
             <a:r>
               <a:rPr b="0" lang="ru-RU" sz="3200" spc="-1" strike="noStrike">
+                <a:solidFill>
+                  <a:srgbClr val="000000"/>
+                </a:solidFill>
                 <a:latin typeface="Source Sans Pro"/>
+                <a:ea typeface="DejaVu Sans"/>
               </a:rPr>
               <a:t>Формальная проверка кода</a:t>
             </a:r>
@@ -5324,7 +5346,7 @@
             </a:endParaRPr>
           </a:p>
           <a:p>
-            <a:pPr marL="432000" indent="-323640">
+            <a:pPr marL="432000" indent="-323280">
               <a:lnSpc>
                 <a:spcPct val="100000"/>
               </a:lnSpc>
@@ -5340,7 +5362,11 @@
             </a:pPr>
             <a:r>
               <a:rPr b="0" lang="ru-RU" sz="3200" spc="-1" strike="noStrike">
+                <a:solidFill>
+                  <a:srgbClr val="000000"/>
+                </a:solidFill>
                 <a:latin typeface="Source Sans Pro"/>
+                <a:ea typeface="DejaVu Sans"/>
               </a:rPr>
               <a:t>Возможность подавления ошибок через инструкции в коде</a:t>
             </a:r>
@@ -5349,7 +5375,7 @@
             </a:endParaRPr>
           </a:p>
           <a:p>
-            <a:pPr marL="432000" indent="-323640">
+            <a:pPr marL="432000" indent="-323280">
               <a:lnSpc>
                 <a:spcPct val="100000"/>
               </a:lnSpc>
@@ -5365,7 +5391,11 @@
             </a:pPr>
             <a:r>
               <a:rPr b="0" lang="ru-RU" sz="3200" spc="-1" strike="noStrike">
+                <a:solidFill>
+                  <a:srgbClr val="000000"/>
+                </a:solidFill>
                 <a:latin typeface="Source Sans Pro"/>
+                <a:ea typeface="DejaVu Sans"/>
               </a:rPr>
               <a:t>Статистика проблем кодовой базы</a:t>
             </a:r>
@@ -5433,7 +5463,7 @@
         <p:spPr>
           <a:xfrm>
             <a:off x="599040" y="121320"/>
-            <a:ext cx="10798200" cy="1261800"/>
+            <a:ext cx="10797840" cy="1261440"/>
           </a:xfrm>
           <a:prstGeom prst="rect">
             <a:avLst/>
@@ -5460,6 +5490,7 @@
                   <a:srgbClr val="ffffff"/>
                 </a:solidFill>
                 <a:latin typeface="Source Sans Pro Light"/>
+                <a:ea typeface="DejaVu Sans"/>
               </a:rPr>
               <a:t>PVS Studio</a:t>
             </a:r>
@@ -5478,7 +5509,7 @@
         <p:spPr>
           <a:xfrm>
             <a:off x="504000" y="1888920"/>
-            <a:ext cx="11088000" cy="5023080"/>
+            <a:ext cx="11087640" cy="5022720"/>
           </a:xfrm>
           <a:prstGeom prst="rect">
             <a:avLst/>
@@ -5499,7 +5530,7 @@
             <a:normAutofit/>
           </a:bodyPr>
           <a:p>
-            <a:pPr marL="432000" indent="-323640">
+            <a:pPr marL="432000" indent="-323280">
               <a:lnSpc>
                 <a:spcPct val="100000"/>
               </a:lnSpc>
@@ -5514,8 +5545,13 @@
               <a:buChar char=""/>
             </a:pPr>
             <a:r>
-              <a:rPr b="0" lang="ru-RU" sz="3200" spc="-1" strike="noStrike">
+              <a:rPr b="0" lang="ru-RU" sz="3200" spc="-1" strike="noStrike" u="sng">
+                <a:solidFill>
+                  <a:srgbClr val="0000ff"/>
+                </a:solidFill>
+                <a:uFillTx/>
                 <a:latin typeface="Source Sans Pro"/>
+                <a:ea typeface="DejaVu Sans"/>
                 <a:hlinkClick r:id="rId1"/>
               </a:rPr>
               <a:t>https://www.viva64.com/ru/pvs-studio/</a:t>
@@ -5525,7 +5561,7 @@
             </a:endParaRPr>
           </a:p>
           <a:p>
-            <a:pPr marL="432000" indent="-323640">
+            <a:pPr marL="432000" indent="-323280">
               <a:lnSpc>
                 <a:spcPct val="100000"/>
               </a:lnSpc>
@@ -5541,13 +5577,22 @@
             </a:pPr>
             <a:r>
               <a:rPr b="0" lang="ru-RU" sz="3200" spc="-1" strike="noStrike">
+                <a:solidFill>
+                  <a:srgbClr val="000000"/>
+                </a:solidFill>
                 <a:latin typeface="Source Sans Pro"/>
+                <a:ea typeface="DejaVu Sans"/>
               </a:rPr>
               <a:t>Бесплатно: </a:t>
             </a:r>
             <a:r>
-              <a:rPr b="0" lang="ru-RU" sz="3200" spc="-1" strike="noStrike">
+              <a:rPr b="0" lang="ru-RU" sz="3200" spc="-1" strike="noStrike" u="sng">
+                <a:solidFill>
+                  <a:srgbClr val="0000ff"/>
+                </a:solidFill>
+                <a:uFillTx/>
                 <a:latin typeface="Source Sans Pro"/>
+                <a:ea typeface="DejaVu Sans"/>
                 <a:hlinkClick r:id="rId2"/>
               </a:rPr>
               <a:t>https://www.viva64.com/ru/b/0457/</a:t>
@@ -5616,7 +5661,7 @@
         <p:spPr>
           <a:xfrm>
             <a:off x="599040" y="121320"/>
-            <a:ext cx="10798200" cy="1261800"/>
+            <a:ext cx="10797840" cy="1261440"/>
           </a:xfrm>
           <a:prstGeom prst="rect">
             <a:avLst/>
@@ -5643,6 +5688,7 @@
                   <a:srgbClr val="ffffff"/>
                 </a:solidFill>
                 <a:latin typeface="Source Sans Pro Light"/>
+                <a:ea typeface="DejaVu Sans"/>
               </a:rPr>
               <a:t>Домашнее задание</a:t>
             </a:r>
@@ -5661,7 +5707,7 @@
         <p:spPr>
           <a:xfrm>
             <a:off x="504000" y="1888920"/>
-            <a:ext cx="11088000" cy="5023080"/>
+            <a:ext cx="11087640" cy="5022720"/>
           </a:xfrm>
           <a:prstGeom prst="rect">
             <a:avLst/>
@@ -5682,7 +5728,7 @@
             <a:normAutofit/>
           </a:bodyPr>
           <a:p>
-            <a:pPr marL="432000" indent="-323640">
+            <a:pPr marL="432000" indent="-323280">
               <a:lnSpc>
                 <a:spcPct val="100000"/>
               </a:lnSpc>
@@ -5698,34 +5744,13 @@
             </a:pPr>
             <a:r>
               <a:rPr b="0" lang="ru-RU" sz="3200" spc="-1" strike="noStrike">
+                <a:solidFill>
+                  <a:srgbClr val="000000"/>
+                </a:solidFill>
                 <a:latin typeface="Source Sans Pro"/>
+                <a:ea typeface="DejaVu Sans"/>
               </a:rPr>
               <a:t>Написать модульные тесты для бизнес-логики</a:t>
-            </a:r>
-            <a:endParaRPr b="0" lang="ru-RU" sz="3200" spc="-1" strike="noStrike">
-              <a:latin typeface="Arial"/>
-            </a:endParaRPr>
-          </a:p>
-          <a:p>
-            <a:pPr marL="432000" indent="-323640">
-              <a:lnSpc>
-                <a:spcPct val="100000"/>
-              </a:lnSpc>
-              <a:spcAft>
-                <a:spcPts val="1409"/>
-              </a:spcAft>
-              <a:buClr>
-                <a:srgbClr val="04617b"/>
-              </a:buClr>
-              <a:buSzPct val="45000"/>
-              <a:buFont typeface="Wingdings" charset="2"/>
-              <a:buChar char=""/>
-            </a:pPr>
-            <a:r>
-              <a:rPr b="0" lang="ru-RU" sz="3200" spc="-1" strike="noStrike">
-                <a:latin typeface="Source Sans Pro"/>
-              </a:rPr>
-              <a:t>Написать интеграционные тесты для контроллеров</a:t>
             </a:r>
             <a:endParaRPr b="0" lang="ru-RU" sz="3200" spc="-1" strike="noStrike">
               <a:latin typeface="Arial"/>
@@ -5791,7 +5816,7 @@
         <p:spPr>
           <a:xfrm>
             <a:off x="599040" y="841320"/>
-            <a:ext cx="10798200" cy="5851440"/>
+            <a:ext cx="10797840" cy="5851080"/>
           </a:xfrm>
           <a:prstGeom prst="rect">
             <a:avLst/>
@@ -5821,6 +5846,7 @@
                   <a:srgbClr val="04617b"/>
                 </a:solidFill>
                 <a:latin typeface="Source Sans Pro Black"/>
+                <a:ea typeface="DejaVu Sans"/>
               </a:rPr>
               <a:t>Спасибо за внимание</a:t>
             </a:r>
@@ -5888,7 +5914,7 @@
         <p:spPr>
           <a:xfrm>
             <a:off x="599040" y="121320"/>
-            <a:ext cx="10798200" cy="1261800"/>
+            <a:ext cx="10797840" cy="1261440"/>
           </a:xfrm>
           <a:prstGeom prst="rect">
             <a:avLst/>
@@ -5915,6 +5941,7 @@
                   <a:srgbClr val="ffffff"/>
                 </a:solidFill>
                 <a:latin typeface="Source Sans Pro Light"/>
+                <a:ea typeface="DejaVu Sans"/>
               </a:rPr>
               <a:t>Верификация, Тестирование, валидация</a:t>
             </a:r>
@@ -5929,6 +5956,7 @@
                   <a:srgbClr val="ffffff"/>
                 </a:solidFill>
                 <a:latin typeface="Source Sans Pro Light"/>
+                <a:ea typeface="DejaVu Sans"/>
               </a:rPr>
               <a:t>Статический анализ</a:t>
             </a:r>
@@ -5947,7 +5975,7 @@
         <p:spPr>
           <a:xfrm>
             <a:off x="599040" y="1920240"/>
-            <a:ext cx="10739160" cy="4663080"/>
+            <a:ext cx="10738800" cy="4662720"/>
           </a:xfrm>
           <a:prstGeom prst="rect">
             <a:avLst/>
@@ -5968,7 +5996,7 @@
             <a:normAutofit/>
           </a:bodyPr>
           <a:p>
-            <a:pPr marL="432000" indent="-323640">
+            <a:pPr marL="432000" indent="-323280">
               <a:lnSpc>
                 <a:spcPct val="100000"/>
               </a:lnSpc>
@@ -5984,7 +6012,11 @@
             </a:pPr>
             <a:r>
               <a:rPr b="0" lang="ru-RU" sz="3200" spc="-1" strike="noStrike">
+                <a:solidFill>
+                  <a:srgbClr val="000000"/>
+                </a:solidFill>
                 <a:latin typeface="Source Sans Pro"/>
+                <a:ea typeface="DejaVu Sans"/>
               </a:rPr>
               <a:t>Верификация — проверяет, что мы собираемся делать то, что нужно заказчику</a:t>
             </a:r>
@@ -5993,7 +6025,7 @@
             </a:endParaRPr>
           </a:p>
           <a:p>
-            <a:pPr marL="432000" indent="-323640">
+            <a:pPr marL="432000" indent="-323280">
               <a:lnSpc>
                 <a:spcPct val="100000"/>
               </a:lnSpc>
@@ -6009,7 +6041,11 @@
             </a:pPr>
             <a:r>
               <a:rPr b="0" lang="ru-RU" sz="3200" spc="-1" strike="noStrike">
+                <a:solidFill>
+                  <a:srgbClr val="000000"/>
+                </a:solidFill>
                 <a:latin typeface="Source Sans Pro"/>
+                <a:ea typeface="DejaVu Sans"/>
               </a:rPr>
               <a:t>Тестирование — проверяет, что код делает то, что мы хотим, соответствие спецификации.</a:t>
             </a:r>
@@ -6018,7 +6054,7 @@
             </a:endParaRPr>
           </a:p>
           <a:p>
-            <a:pPr marL="432000" indent="-323640">
+            <a:pPr marL="432000" indent="-323280">
               <a:lnSpc>
                 <a:spcPct val="100000"/>
               </a:lnSpc>
@@ -6034,7 +6070,11 @@
             </a:pPr>
             <a:r>
               <a:rPr b="0" lang="ru-RU" sz="3200" spc="-1" strike="noStrike">
+                <a:solidFill>
+                  <a:srgbClr val="000000"/>
+                </a:solidFill>
                 <a:latin typeface="Source Sans Pro"/>
+                <a:ea typeface="DejaVu Sans"/>
               </a:rPr>
               <a:t>Валидация — проверяет, что код делает то, что нужно заказчику. UAT, приемка, etc.</a:t>
             </a:r>
@@ -6043,7 +6083,7 @@
             </a:endParaRPr>
           </a:p>
           <a:p>
-            <a:pPr marL="432000" indent="-323640">
+            <a:pPr marL="432000" indent="-323280">
               <a:lnSpc>
                 <a:spcPct val="100000"/>
               </a:lnSpc>
@@ -6059,7 +6099,11 @@
             </a:pPr>
             <a:r>
               <a:rPr b="0" lang="ru-RU" sz="3200" spc="-1" strike="noStrike">
+                <a:solidFill>
+                  <a:srgbClr val="000000"/>
+                </a:solidFill>
                 <a:latin typeface="Source Sans Pro"/>
+                <a:ea typeface="DejaVu Sans"/>
               </a:rPr>
               <a:t>Статический анализ — проверка кода на наличие/отсутствие определенных шаблонов</a:t>
             </a:r>
@@ -6127,7 +6171,7 @@
         <p:spPr>
           <a:xfrm>
             <a:off x="599040" y="121320"/>
-            <a:ext cx="10798200" cy="1261800"/>
+            <a:ext cx="10797840" cy="1261440"/>
           </a:xfrm>
           <a:prstGeom prst="rect">
             <a:avLst/>
@@ -6159,6 +6203,7 @@
                   <a:srgbClr val="ffffff"/>
                 </a:solidFill>
                 <a:latin typeface="Source Sans Pro Light"/>
+                <a:ea typeface="DejaVu Sans"/>
               </a:rPr>
               <a:t>Автоматизируемое тестирование</a:t>
             </a:r>
@@ -6170,14 +6215,14 @@
       </p:sp>
       <p:sp>
         <p:nvSpPr>
-          <p:cNvPr id="119" name="TextShape 2"/>
-          <p:cNvSpPr txBox="1"/>
+          <p:cNvPr id="119" name="CustomShape 2"/>
+          <p:cNvSpPr/>
           <p:nvPr/>
         </p:nvSpPr>
         <p:spPr>
           <a:xfrm>
             <a:off x="6264000" y="6552000"/>
-            <a:ext cx="5688000" cy="602280"/>
+            <a:ext cx="5687640" cy="601920"/>
           </a:xfrm>
           <a:prstGeom prst="rect">
             <a:avLst/>
@@ -6187,6 +6232,12 @@
             <a:noFill/>
           </a:ln>
         </p:spPr>
+        <p:style>
+          <a:lnRef idx="0"/>
+          <a:fillRef idx="0"/>
+          <a:effectRef idx="0"/>
+          <a:fontRef idx="minor"/>
+        </p:style>
         <p:txBody>
           <a:bodyPr lIns="90000" rIns="90000" tIns="45000" bIns="45000"/>
           <a:p>
@@ -6215,7 +6266,7 @@
         <p:spPr>
           <a:xfrm>
             <a:off x="5348880" y="1656000"/>
-            <a:ext cx="6649560" cy="4968000"/>
+            <a:ext cx="6649200" cy="4967640"/>
           </a:xfrm>
           <a:prstGeom prst="rect">
             <a:avLst/>
@@ -6238,7 +6289,7 @@
         <p:spPr>
           <a:xfrm>
             <a:off x="216000" y="2088000"/>
-            <a:ext cx="5714640" cy="4238280"/>
+            <a:ext cx="5714280" cy="4237920"/>
           </a:xfrm>
           <a:prstGeom prst="rect">
             <a:avLst/>
@@ -6250,14 +6301,14 @@
       </p:pic>
       <p:sp>
         <p:nvSpPr>
-          <p:cNvPr id="122" name="TextShape 3"/>
-          <p:cNvSpPr txBox="1"/>
+          <p:cNvPr id="122" name="CustomShape 3"/>
+          <p:cNvSpPr/>
           <p:nvPr/>
         </p:nvSpPr>
         <p:spPr>
           <a:xfrm>
             <a:off x="504000" y="6552000"/>
-            <a:ext cx="5571000" cy="346680"/>
+            <a:ext cx="5570640" cy="346320"/>
           </a:xfrm>
           <a:prstGeom prst="rect">
             <a:avLst/>
@@ -6267,6 +6318,12 @@
             <a:noFill/>
           </a:ln>
         </p:spPr>
+        <p:style>
+          <a:lnRef idx="0"/>
+          <a:fillRef idx="0"/>
+          <a:effectRef idx="0"/>
+          <a:fontRef idx="minor"/>
+        </p:style>
         <p:txBody>
           <a:bodyPr lIns="90000" rIns="90000" tIns="45000" bIns="45000"/>
           <a:p>
@@ -6340,7 +6397,7 @@
         <p:spPr>
           <a:xfrm>
             <a:off x="599040" y="121320"/>
-            <a:ext cx="10798200" cy="1261800"/>
+            <a:ext cx="10797840" cy="1261440"/>
           </a:xfrm>
           <a:prstGeom prst="rect">
             <a:avLst/>
@@ -6367,6 +6424,7 @@
                   <a:srgbClr val="ffffff"/>
                 </a:solidFill>
                 <a:latin typeface="Source Sans Pro Light"/>
+                <a:ea typeface="DejaVu Sans"/>
               </a:rPr>
               <a:t>Модульное (unit) тестирование</a:t>
             </a:r>
@@ -6385,7 +6443,7 @@
         <p:spPr>
           <a:xfrm>
             <a:off x="599040" y="1920240"/>
-            <a:ext cx="10739160" cy="4663080"/>
+            <a:ext cx="10738800" cy="4662720"/>
           </a:xfrm>
           <a:prstGeom prst="rect">
             <a:avLst/>
@@ -6406,7 +6464,7 @@
             <a:normAutofit/>
           </a:bodyPr>
           <a:p>
-            <a:pPr marL="432000" indent="-323640">
+            <a:pPr marL="432000" indent="-323280">
               <a:lnSpc>
                 <a:spcPct val="100000"/>
               </a:lnSpc>
@@ -6422,7 +6480,11 @@
             </a:pPr>
             <a:r>
               <a:rPr b="0" lang="ru-RU" sz="3200" spc="-1" strike="noStrike">
+                <a:solidFill>
+                  <a:srgbClr val="000000"/>
+                </a:solidFill>
                 <a:latin typeface="Source Sans Pro"/>
+                <a:ea typeface="DejaVu Sans"/>
               </a:rPr>
               <a:t>Модульное тестирование — проверка отдельных, изолированных частей кода. Обычно — отдельных методов или групп методов внутри одного класса</a:t>
             </a:r>
@@ -6431,7 +6493,7 @@
             </a:endParaRPr>
           </a:p>
           <a:p>
-            <a:pPr marL="432000" indent="-323640">
+            <a:pPr marL="432000" indent="-323280">
               <a:lnSpc>
                 <a:spcPct val="100000"/>
               </a:lnSpc>
@@ -6447,7 +6509,11 @@
             </a:pPr>
             <a:r>
               <a:rPr b="0" lang="ru-RU" sz="3200" spc="-1" strike="noStrike">
+                <a:solidFill>
+                  <a:srgbClr val="000000"/>
+                </a:solidFill>
                 <a:latin typeface="Source Sans Pro"/>
+                <a:ea typeface="DejaVu Sans"/>
               </a:rPr>
               <a:t>Чем чище код, тем меньше ветвлений, тем меньше вариантов на один тест</a:t>
             </a:r>
@@ -6456,7 +6522,7 @@
             </a:endParaRPr>
           </a:p>
           <a:p>
-            <a:pPr marL="432000" indent="-323640">
+            <a:pPr marL="432000" indent="-323280">
               <a:lnSpc>
                 <a:spcPct val="100000"/>
               </a:lnSpc>
@@ -6472,7 +6538,11 @@
             </a:pPr>
             <a:r>
               <a:rPr b="0" lang="ru-RU" sz="3200" spc="-1" strike="noStrike">
+                <a:solidFill>
+                  <a:srgbClr val="000000"/>
+                </a:solidFill>
                 <a:latin typeface="Source Sans Pro"/>
+                <a:ea typeface="DejaVu Sans"/>
               </a:rPr>
               <a:t>Используем тестовые объекты для всех зависимостей</a:t>
             </a:r>
@@ -6481,7 +6551,7 @@
             </a:endParaRPr>
           </a:p>
           <a:p>
-            <a:pPr marL="432000" indent="-323640">
+            <a:pPr marL="432000" indent="-323280">
               <a:lnSpc>
                 <a:spcPct val="100000"/>
               </a:lnSpc>
@@ -6497,7 +6567,11 @@
             </a:pPr>
             <a:r>
               <a:rPr b="0" lang="ru-RU" sz="3200" spc="-1" strike="noStrike">
+                <a:solidFill>
+                  <a:srgbClr val="000000"/>
+                </a:solidFill>
                 <a:latin typeface="Source Sans Pro"/>
+                <a:ea typeface="DejaVu Sans"/>
               </a:rPr>
               <a:t>TDD предполагает запуск всех потенциально затронутых тестов при разработке([Test]-Red-[Test]-Green-Refactor-…), не более 10 секунд</a:t>
             </a:r>
@@ -6506,7 +6580,7 @@
             </a:endParaRPr>
           </a:p>
           <a:p>
-            <a:pPr marL="432000" indent="-323640">
+            <a:pPr marL="432000" indent="-323280">
               <a:lnSpc>
                 <a:spcPct val="100000"/>
               </a:lnSpc>
@@ -6522,7 +6596,11 @@
             </a:pPr>
             <a:r>
               <a:rPr b="0" lang="ru-RU" sz="3200" spc="-1" strike="noStrike">
+                <a:solidFill>
+                  <a:srgbClr val="000000"/>
+                </a:solidFill>
                 <a:latin typeface="Source Sans Pro"/>
+                <a:ea typeface="DejaVu Sans"/>
               </a:rPr>
               <a:t>Moq</a:t>
             </a:r>
@@ -6590,7 +6668,7 @@
         <p:spPr>
           <a:xfrm>
             <a:off x="599040" y="121320"/>
-            <a:ext cx="10798200" cy="1261800"/>
+            <a:ext cx="10797840" cy="1261440"/>
           </a:xfrm>
           <a:prstGeom prst="rect">
             <a:avLst/>
@@ -6617,6 +6695,7 @@
                   <a:srgbClr val="ffffff"/>
                 </a:solidFill>
                 <a:latin typeface="Source Sans Pro Light"/>
+                <a:ea typeface="DejaVu Sans"/>
               </a:rPr>
               <a:t>Интеграционное тестирование</a:t>
             </a:r>
@@ -6635,7 +6714,7 @@
         <p:spPr>
           <a:xfrm>
             <a:off x="599040" y="1920240"/>
-            <a:ext cx="10739160" cy="4663080"/>
+            <a:ext cx="10738800" cy="4662720"/>
           </a:xfrm>
           <a:prstGeom prst="rect">
             <a:avLst/>
@@ -6656,7 +6735,7 @@
             <a:normAutofit/>
           </a:bodyPr>
           <a:p>
-            <a:pPr marL="432000" indent="-323640">
+            <a:pPr marL="432000" indent="-323280">
               <a:lnSpc>
                 <a:spcPct val="100000"/>
               </a:lnSpc>
@@ -6672,7 +6751,11 @@
             </a:pPr>
             <a:r>
               <a:rPr b="0" lang="ru-RU" sz="3200" spc="-1" strike="noStrike">
+                <a:solidFill>
+                  <a:srgbClr val="000000"/>
+                </a:solidFill>
                 <a:latin typeface="Source Sans Pro"/>
+                <a:ea typeface="DejaVu Sans"/>
               </a:rPr>
               <a:t>Проверяет сценарии использования системы</a:t>
             </a:r>
@@ -6681,7 +6764,7 @@
             </a:endParaRPr>
           </a:p>
           <a:p>
-            <a:pPr marL="432000" indent="-323640">
+            <a:pPr marL="432000" indent="-323280">
               <a:lnSpc>
                 <a:spcPct val="100000"/>
               </a:lnSpc>
@@ -6697,7 +6780,11 @@
             </a:pPr>
             <a:r>
               <a:rPr b="0" lang="ru-RU" sz="3200" spc="-1" strike="noStrike">
+                <a:solidFill>
+                  <a:srgbClr val="000000"/>
+                </a:solidFill>
                 <a:latin typeface="Source Sans Pro"/>
+                <a:ea typeface="DejaVu Sans"/>
               </a:rPr>
               <a:t>Используем реальные объекты</a:t>
             </a:r>
@@ -6706,7 +6793,7 @@
             </a:endParaRPr>
           </a:p>
           <a:p>
-            <a:pPr marL="432000" indent="-323640">
+            <a:pPr marL="432000" indent="-323280">
               <a:lnSpc>
                 <a:spcPct val="100000"/>
               </a:lnSpc>
@@ -6722,7 +6809,11 @@
             </a:pPr>
             <a:r>
               <a:rPr b="0" lang="ru-RU" sz="3200" spc="-1" strike="noStrike">
+                <a:solidFill>
+                  <a:srgbClr val="000000"/>
+                </a:solidFill>
                 <a:latin typeface="Source Sans Pro"/>
+                <a:ea typeface="DejaVu Sans"/>
               </a:rPr>
               <a:t>Тестирование методов черного ящика</a:t>
             </a:r>
@@ -6731,7 +6822,7 @@
             </a:endParaRPr>
           </a:p>
           <a:p>
-            <a:pPr marL="432000" indent="-323640">
+            <a:pPr marL="432000" indent="-323280">
               <a:lnSpc>
                 <a:spcPct val="100000"/>
               </a:lnSpc>
@@ -6747,13 +6838,21 @@
             </a:pPr>
             <a:r>
               <a:rPr b="0" lang="ru-RU" sz="3200" spc="-1" strike="noStrike">
+                <a:solidFill>
+                  <a:srgbClr val="000000"/>
+                </a:solidFill>
                 <a:latin typeface="Source Sans Pro"/>
+                <a:ea typeface="DejaVu Sans"/>
               </a:rPr>
               <a:t> </a:t>
             </a:r>
             <a:r>
               <a:rPr b="0" lang="ru-RU" sz="3200" spc="-1" strike="noStrike">
+                <a:solidFill>
+                  <a:srgbClr val="000000"/>
+                </a:solidFill>
                 <a:latin typeface="Source Sans Pro"/>
+                <a:ea typeface="DejaVu Sans"/>
               </a:rPr>
               <a:t>Запуск перед отправкой задачи на тестирование, плюс на сервере сборки</a:t>
             </a:r>
@@ -6821,7 +6920,7 @@
         <p:spPr>
           <a:xfrm>
             <a:off x="599040" y="121320"/>
-            <a:ext cx="10798200" cy="1261800"/>
+            <a:ext cx="10797840" cy="1261440"/>
           </a:xfrm>
           <a:prstGeom prst="rect">
             <a:avLst/>
@@ -6848,6 +6947,7 @@
                   <a:srgbClr val="ffffff"/>
                 </a:solidFill>
                 <a:latin typeface="Source Sans Pro Light"/>
+                <a:ea typeface="DejaVu Sans"/>
               </a:rPr>
               <a:t>Системное (end-to-end, system, etc.)</a:t>
             </a:r>
@@ -6866,7 +6966,7 @@
         <p:spPr>
           <a:xfrm>
             <a:off x="599040" y="1920240"/>
-            <a:ext cx="10739160" cy="4663080"/>
+            <a:ext cx="10738800" cy="4662720"/>
           </a:xfrm>
           <a:prstGeom prst="rect">
             <a:avLst/>
@@ -6887,7 +6987,7 @@
             <a:normAutofit/>
           </a:bodyPr>
           <a:p>
-            <a:pPr marL="432000" indent="-323640">
+            <a:pPr marL="432000" indent="-323280">
               <a:lnSpc>
                 <a:spcPct val="100000"/>
               </a:lnSpc>
@@ -6903,7 +7003,11 @@
             </a:pPr>
             <a:r>
               <a:rPr b="0" lang="ru-RU" sz="3200" spc="-1" strike="noStrike">
+                <a:solidFill>
+                  <a:srgbClr val="000000"/>
+                </a:solidFill>
                 <a:latin typeface="Source Sans Pro"/>
+                <a:ea typeface="DejaVu Sans"/>
               </a:rPr>
               <a:t>Проверка всей системы в целом</a:t>
             </a:r>
@@ -6912,7 +7016,7 @@
             </a:endParaRPr>
           </a:p>
           <a:p>
-            <a:pPr marL="432000" indent="-323640">
+            <a:pPr marL="432000" indent="-323280">
               <a:lnSpc>
                 <a:spcPct val="100000"/>
               </a:lnSpc>
@@ -6928,7 +7032,11 @@
             </a:pPr>
             <a:r>
               <a:rPr b="0" lang="ru-RU" sz="3200" spc="-1" strike="noStrike">
+                <a:solidFill>
+                  <a:srgbClr val="000000"/>
+                </a:solidFill>
                 <a:latin typeface="Source Sans Pro"/>
+                <a:ea typeface="DejaVu Sans"/>
               </a:rPr>
               <a:t>Автоматизация использования UI/API</a:t>
             </a:r>
@@ -6937,7 +7045,7 @@
             </a:endParaRPr>
           </a:p>
           <a:p>
-            <a:pPr marL="432000" indent="-323640">
+            <a:pPr marL="432000" indent="-323280">
               <a:lnSpc>
                 <a:spcPct val="100000"/>
               </a:lnSpc>
@@ -6953,7 +7061,11 @@
             </a:pPr>
             <a:r>
               <a:rPr b="0" lang="ru-RU" sz="3200" spc="-1" strike="noStrike">
+                <a:solidFill>
+                  <a:srgbClr val="000000"/>
+                </a:solidFill>
                 <a:latin typeface="Source Sans Pro"/>
+                <a:ea typeface="DejaVu Sans"/>
               </a:rPr>
               <a:t>Возможные варианты:</a:t>
             </a:r>
@@ -6972,7 +7084,11 @@
             </a:pPr>
             <a:r>
               <a:rPr b="0" lang="ru-RU" sz="3200" spc="-1" strike="noStrike">
+                <a:solidFill>
+                  <a:srgbClr val="000000"/>
+                </a:solidFill>
                 <a:latin typeface="Source Sans Pro"/>
+                <a:ea typeface="DejaVu Sans"/>
               </a:rPr>
               <a:t>1. Usability testing</a:t>
             </a:r>
@@ -6991,7 +7107,11 @@
             </a:pPr>
             <a:r>
               <a:rPr b="0" lang="ru-RU" sz="3200" spc="-1" strike="noStrike">
+                <a:solidFill>
+                  <a:srgbClr val="000000"/>
+                </a:solidFill>
                 <a:latin typeface="Source Sans Pro"/>
+                <a:ea typeface="DejaVu Sans"/>
               </a:rPr>
               <a:t>2. Performance testing</a:t>
             </a:r>
@@ -7010,7 +7130,11 @@
             </a:pPr>
             <a:r>
               <a:rPr b="0" lang="ru-RU" sz="3200" spc="-1" strike="noStrike">
+                <a:solidFill>
+                  <a:srgbClr val="000000"/>
+                </a:solidFill>
                 <a:latin typeface="Source Sans Pro"/>
+                <a:ea typeface="DejaVu Sans"/>
               </a:rPr>
               <a:t>3. Load testing</a:t>
             </a:r>
@@ -7029,7 +7153,11 @@
             </a:pPr>
             <a:r>
               <a:rPr b="0" lang="ru-RU" sz="3200" spc="-1" strike="noStrike">
+                <a:solidFill>
+                  <a:srgbClr val="000000"/>
+                </a:solidFill>
                 <a:latin typeface="Source Sans Pro"/>
+                <a:ea typeface="DejaVu Sans"/>
               </a:rPr>
               <a:t>4. Stress testing</a:t>
             </a:r>
@@ -7048,7 +7176,11 @@
             </a:pPr>
             <a:r>
               <a:rPr b="0" lang="ru-RU" sz="3200" spc="-1" strike="noStrike">
+                <a:solidFill>
+                  <a:srgbClr val="000000"/>
+                </a:solidFill>
                 <a:latin typeface="Source Sans Pro"/>
+                <a:ea typeface="DejaVu Sans"/>
               </a:rPr>
               <a:t>5. Security testing</a:t>
             </a:r>
@@ -7067,7 +7199,11 @@
             </a:pPr>
             <a:r>
               <a:rPr b="0" lang="ru-RU" sz="3200" spc="-1" strike="noStrike">
+                <a:solidFill>
+                  <a:srgbClr val="000000"/>
+                </a:solidFill>
                 <a:latin typeface="Source Sans Pro"/>
+                <a:ea typeface="DejaVu Sans"/>
               </a:rPr>
               <a:t>6. Configuration testing</a:t>
             </a:r>
@@ -7086,7 +7222,11 @@
             </a:pPr>
             <a:r>
               <a:rPr b="0" lang="ru-RU" sz="3200" spc="-1" strike="noStrike">
+                <a:solidFill>
+                  <a:srgbClr val="000000"/>
+                </a:solidFill>
                 <a:latin typeface="Source Sans Pro"/>
+                <a:ea typeface="DejaVu Sans"/>
               </a:rPr>
               <a:t>7. Compatibility testing</a:t>
             </a:r>
@@ -7105,7 +7245,11 @@
             </a:pPr>
             <a:r>
               <a:rPr b="0" lang="ru-RU" sz="3200" spc="-1" strike="noStrike">
+                <a:solidFill>
+                  <a:srgbClr val="000000"/>
+                </a:solidFill>
                 <a:latin typeface="Source Sans Pro"/>
+                <a:ea typeface="DejaVu Sans"/>
               </a:rPr>
               <a:t>8. Installability testing</a:t>
             </a:r>
@@ -7124,7 +7268,11 @@
             </a:pPr>
             <a:r>
               <a:rPr b="0" lang="ru-RU" sz="3200" spc="-1" strike="noStrike">
+                <a:solidFill>
+                  <a:srgbClr val="000000"/>
+                </a:solidFill>
                 <a:latin typeface="Source Sans Pro"/>
+                <a:ea typeface="DejaVu Sans"/>
               </a:rPr>
               <a:t>9. Recovery testing</a:t>
             </a:r>
@@ -7143,7 +7291,11 @@
             </a:pPr>
             <a:r>
               <a:rPr b="0" lang="ru-RU" sz="3200" spc="-1" strike="noStrike">
+                <a:solidFill>
+                  <a:srgbClr val="000000"/>
+                </a:solidFill>
                 <a:latin typeface="Source Sans Pro"/>
+                <a:ea typeface="DejaVu Sans"/>
               </a:rPr>
               <a:t>10. Availability testing</a:t>
             </a:r>
@@ -7162,7 +7314,11 @@
             </a:pPr>
             <a:r>
               <a:rPr b="0" lang="ru-RU" sz="3200" spc="-1" strike="noStrike">
+                <a:solidFill>
+                  <a:srgbClr val="000000"/>
+                </a:solidFill>
                 <a:latin typeface="Source Sans Pro"/>
+                <a:ea typeface="DejaVu Sans"/>
               </a:rPr>
               <a:t>11. Volume testing</a:t>
             </a:r>
@@ -7230,7 +7386,7 @@
         <p:spPr>
           <a:xfrm>
             <a:off x="599040" y="121320"/>
-            <a:ext cx="10798200" cy="1261800"/>
+            <a:ext cx="10797840" cy="1261440"/>
           </a:xfrm>
           <a:prstGeom prst="rect">
             <a:avLst/>
@@ -7257,6 +7413,7 @@
                   <a:srgbClr val="ffffff"/>
                 </a:solidFill>
                 <a:latin typeface="Source Sans Pro Light"/>
+                <a:ea typeface="DejaVu Sans"/>
               </a:rPr>
               <a:t>Приемочное тестирование</a:t>
             </a:r>
@@ -7275,7 +7432,7 @@
         <p:spPr>
           <a:xfrm>
             <a:off x="599040" y="1920240"/>
-            <a:ext cx="10739160" cy="4663080"/>
+            <a:ext cx="10738800" cy="4662720"/>
           </a:xfrm>
           <a:prstGeom prst="rect">
             <a:avLst/>
@@ -7296,7 +7453,7 @@
             <a:normAutofit/>
           </a:bodyPr>
           <a:p>
-            <a:pPr marL="432000" indent="-323640">
+            <a:pPr marL="432000" indent="-323280">
               <a:lnSpc>
                 <a:spcPct val="100000"/>
               </a:lnSpc>
@@ -7312,7 +7469,11 @@
             </a:pPr>
             <a:r>
               <a:rPr b="0" lang="ru-RU" sz="3200" spc="-1" strike="noStrike">
+                <a:solidFill>
+                  <a:srgbClr val="000000"/>
+                </a:solidFill>
                 <a:latin typeface="Source Sans Pro"/>
+                <a:ea typeface="DejaVu Sans"/>
               </a:rPr>
               <a:t>Финальное тестирование перед релизом</a:t>
             </a:r>
@@ -7321,7 +7482,7 @@
             </a:endParaRPr>
           </a:p>
           <a:p>
-            <a:pPr marL="432000" indent="-323640">
+            <a:pPr marL="432000" indent="-323280">
               <a:lnSpc>
                 <a:spcPct val="100000"/>
               </a:lnSpc>
@@ -7337,7 +7498,11 @@
             </a:pPr>
             <a:r>
               <a:rPr b="0" lang="ru-RU" sz="3200" spc="-1" strike="noStrike">
+                <a:solidFill>
+                  <a:srgbClr val="000000"/>
+                </a:solidFill>
                 <a:latin typeface="Source Sans Pro"/>
+                <a:ea typeface="DejaVu Sans"/>
               </a:rPr>
               <a:t>Проводится аналитиком/менеджером продукта/представителями заказчика</a:t>
             </a:r>
@@ -7346,7 +7511,7 @@
             </a:endParaRPr>
           </a:p>
           <a:p>
-            <a:pPr marL="432000" indent="-323640">
+            <a:pPr marL="432000" indent="-323280">
               <a:lnSpc>
                 <a:spcPct val="100000"/>
               </a:lnSpc>
@@ -7362,7 +7527,11 @@
             </a:pPr>
             <a:r>
               <a:rPr b="0" lang="ru-RU" sz="3200" spc="-1" strike="noStrike">
+                <a:solidFill>
+                  <a:srgbClr val="000000"/>
+                </a:solidFill>
                 <a:latin typeface="Source Sans Pro"/>
+                <a:ea typeface="DejaVu Sans"/>
               </a:rPr>
               <a:t>Валидация</a:t>
             </a:r>
@@ -7430,7 +7599,7 @@
         <p:spPr>
           <a:xfrm>
             <a:off x="599040" y="121320"/>
-            <a:ext cx="10798200" cy="1261800"/>
+            <a:ext cx="10797840" cy="1261440"/>
           </a:xfrm>
           <a:prstGeom prst="rect">
             <a:avLst/>
@@ -7457,6 +7626,7 @@
                   <a:srgbClr val="ffffff"/>
                 </a:solidFill>
                 <a:latin typeface="Source Sans Pro Light"/>
+                <a:ea typeface="DejaVu Sans"/>
               </a:rPr>
               <a:t>NUnit</a:t>
             </a:r>
@@ -7475,7 +7645,7 @@
         <p:spPr>
           <a:xfrm>
             <a:off x="504000" y="1888920"/>
-            <a:ext cx="10739160" cy="4663080"/>
+            <a:ext cx="10738800" cy="4662720"/>
           </a:xfrm>
           <a:prstGeom prst="rect">
             <a:avLst/>
@@ -7496,7 +7666,7 @@
             <a:normAutofit/>
           </a:bodyPr>
           <a:p>
-            <a:pPr marL="432000" indent="-323640">
+            <a:pPr marL="432000" indent="-323280">
               <a:lnSpc>
                 <a:spcPct val="100000"/>
               </a:lnSpc>
@@ -7512,7 +7682,11 @@
             </a:pPr>
             <a:r>
               <a:rPr b="0" lang="ru-RU" sz="3200" spc="-1" strike="noStrike">
+                <a:solidFill>
+                  <a:srgbClr val="000000"/>
+                </a:solidFill>
                 <a:latin typeface="Source Sans Pro"/>
+                <a:ea typeface="DejaVu Sans"/>
               </a:rPr>
               <a:t>Open source</a:t>
             </a:r>
@@ -7521,7 +7695,7 @@
             </a:endParaRPr>
           </a:p>
           <a:p>
-            <a:pPr marL="432000" indent="-323640">
+            <a:pPr marL="432000" indent="-323280">
               <a:lnSpc>
                 <a:spcPct val="100000"/>
               </a:lnSpc>
@@ -7537,7 +7711,11 @@
             </a:pPr>
             <a:r>
               <a:rPr b="0" lang="ru-RU" sz="3200" spc="-1" strike="noStrike">
+                <a:solidFill>
+                  <a:srgbClr val="000000"/>
+                </a:solidFill>
                 <a:latin typeface="Source Sans Pro"/>
+                <a:ea typeface="DejaVu Sans"/>
               </a:rPr>
               <a:t>Интегрируется в ReSharper</a:t>
             </a:r>
@@ -7546,7 +7724,7 @@
             </a:endParaRPr>
           </a:p>
           <a:p>
-            <a:pPr marL="432000" indent="-323640">
+            <a:pPr marL="432000" indent="-323280">
               <a:lnSpc>
                 <a:spcPct val="100000"/>
               </a:lnSpc>
@@ -7562,7 +7740,11 @@
             </a:pPr>
             <a:r>
               <a:rPr b="0" lang="ru-RU" sz="3200" spc="-1" strike="noStrike">
+                <a:solidFill>
+                  <a:srgbClr val="000000"/>
+                </a:solidFill>
                 <a:latin typeface="Source Sans Pro"/>
+                <a:ea typeface="DejaVu Sans"/>
               </a:rPr>
               <a:t>Интегрируется в VS через NUnit Test Adapter</a:t>
             </a:r>
@@ -7571,7 +7753,7 @@
             </a:endParaRPr>
           </a:p>
           <a:p>
-            <a:pPr marL="432000" indent="-323640">
+            <a:pPr marL="432000" indent="-323280">
               <a:lnSpc>
                 <a:spcPct val="100000"/>
               </a:lnSpc>
@@ -7587,7 +7769,11 @@
             </a:pPr>
             <a:r>
               <a:rPr b="0" lang="ru-RU" sz="3200" spc="-1" strike="noStrike">
+                <a:solidFill>
+                  <a:srgbClr val="000000"/>
+                </a:solidFill>
                 <a:latin typeface="Source Sans Pro"/>
+                <a:ea typeface="DejaVu Sans"/>
               </a:rPr>
               <a:t>Документация: https://github.com/nunit/docs/wiki</a:t>
             </a:r>
@@ -7655,7 +7841,7 @@
         <p:spPr>
           <a:xfrm>
             <a:off x="599040" y="121320"/>
-            <a:ext cx="10798200" cy="1261800"/>
+            <a:ext cx="10797840" cy="1261440"/>
           </a:xfrm>
           <a:prstGeom prst="rect">
             <a:avLst/>
@@ -7682,6 +7868,7 @@
                   <a:srgbClr val="ffffff"/>
                 </a:solidFill>
                 <a:latin typeface="Source Sans Pro Light"/>
+                <a:ea typeface="DejaVu Sans"/>
               </a:rPr>
               <a:t>Покрытие кода тестами</a:t>
             </a:r>
@@ -7700,7 +7887,7 @@
         <p:spPr>
           <a:xfrm>
             <a:off x="504000" y="1888920"/>
-            <a:ext cx="10739160" cy="4663080"/>
+            <a:ext cx="10738800" cy="4662720"/>
           </a:xfrm>
           <a:prstGeom prst="rect">
             <a:avLst/>
@@ -7721,7 +7908,7 @@
             <a:normAutofit/>
           </a:bodyPr>
           <a:p>
-            <a:pPr marL="432000" indent="-323640">
+            <a:pPr marL="432000" indent="-323280">
               <a:lnSpc>
                 <a:spcPct val="100000"/>
               </a:lnSpc>
@@ -7737,7 +7924,11 @@
             </a:pPr>
             <a:r>
               <a:rPr b="0" lang="ru-RU" sz="3200" spc="-1" strike="noStrike">
+                <a:solidFill>
+                  <a:srgbClr val="000000"/>
+                </a:solidFill>
                 <a:latin typeface="Source Sans Pro"/>
+                <a:ea typeface="DejaVu Sans"/>
               </a:rPr>
               <a:t>100% покрытие кода тестами это еще не 100% проверка логики</a:t>
             </a:r>
@@ -7746,7 +7937,7 @@
             </a:endParaRPr>
           </a:p>
           <a:p>
-            <a:pPr marL="432000" indent="-323640">
+            <a:pPr marL="432000" indent="-323280">
               <a:lnSpc>
                 <a:spcPct val="100000"/>
               </a:lnSpc>
@@ -7762,13 +7953,22 @@
             </a:pPr>
             <a:r>
               <a:rPr b="0" lang="ru-RU" sz="3200" spc="-1" strike="noStrike">
+                <a:solidFill>
+                  <a:srgbClr val="000000"/>
+                </a:solidFill>
                 <a:latin typeface="Source Sans Pro"/>
+                <a:ea typeface="DejaVu Sans"/>
               </a:rPr>
               <a:t>OpenCover: </a:t>
             </a:r>
             <a:r>
-              <a:rPr b="0" lang="ru-RU" sz="3200" spc="-1" strike="noStrike">
+              <a:rPr b="0" lang="ru-RU" sz="3200" spc="-1" strike="noStrike" u="sng">
+                <a:solidFill>
+                  <a:srgbClr val="0000ff"/>
+                </a:solidFill>
+                <a:uFillTx/>
                 <a:latin typeface="Source Sans Pro"/>
+                <a:ea typeface="DejaVu Sans"/>
                 <a:hlinkClick r:id="rId1"/>
               </a:rPr>
               <a:t>https://github.com/OpenCover/opencover</a:t>
@@ -7778,7 +7978,7 @@
             </a:endParaRPr>
           </a:p>
           <a:p>
-            <a:pPr marL="432000" indent="-323640">
+            <a:pPr marL="432000" indent="-323280">
               <a:lnSpc>
                 <a:spcPct val="100000"/>
               </a:lnSpc>
@@ -7794,13 +7994,22 @@
             </a:pPr>
             <a:r>
               <a:rPr b="0" lang="ru-RU" sz="3200" spc="-1" strike="noStrike">
+                <a:solidFill>
+                  <a:srgbClr val="000000"/>
+                </a:solidFill>
                 <a:latin typeface="Source Sans Pro"/>
+                <a:ea typeface="DejaVu Sans"/>
               </a:rPr>
               <a:t>ReportGenerator </a:t>
             </a:r>
             <a:r>
-              <a:rPr b="0" lang="ru-RU" sz="3200" spc="-1" strike="noStrike">
+              <a:rPr b="0" lang="ru-RU" sz="3200" spc="-1" strike="noStrike" u="sng">
+                <a:solidFill>
+                  <a:srgbClr val="0000ff"/>
+                </a:solidFill>
+                <a:uFillTx/>
                 <a:latin typeface="Source Sans Pro"/>
+                <a:ea typeface="DejaVu Sans"/>
                 <a:hlinkClick r:id="rId2"/>
               </a:rPr>
               <a:t>https://github.com/danielpalme/ReportGenerator</a:t>
@@ -7810,7 +8019,7 @@
             </a:endParaRPr>
           </a:p>
           <a:p>
-            <a:pPr marL="432000" indent="-323640">
+            <a:pPr marL="432000" indent="-323280">
               <a:lnSpc>
                 <a:spcPct val="100000"/>
               </a:lnSpc>
@@ -7826,13 +8035,22 @@
             </a:pPr>
             <a:r>
               <a:rPr b="0" lang="ru-RU" sz="3200" spc="-1" strike="noStrike">
+                <a:solidFill>
+                  <a:srgbClr val="000000"/>
+                </a:solidFill>
                 <a:latin typeface="Source Sans Pro"/>
+                <a:ea typeface="DejaVu Sans"/>
               </a:rPr>
               <a:t>Для загрузки результатов в Azure DevOps: </a:t>
             </a:r>
             <a:r>
-              <a:rPr b="0" lang="ru-RU" sz="3200" spc="-1" strike="noStrike">
+              <a:rPr b="0" lang="ru-RU" sz="3200" spc="-1" strike="noStrike" u="sng">
+                <a:solidFill>
+                  <a:srgbClr val="0000ff"/>
+                </a:solidFill>
+                <a:uFillTx/>
                 <a:latin typeface="Source Sans Pro"/>
+                <a:ea typeface="DejaVu Sans"/>
                 <a:hlinkClick r:id="rId3"/>
               </a:rPr>
               <a:t>https://github.com/danielpalme/OpenCoverToCoberturaConverter</a:t>

</xml_diff>

<commit_message>
Materials for testing lesson
</commit_message>
<xml_diff>
--- a/docs/ETU DIT #2.pptx
+++ b/docs/ETU DIT #2.pptx
@@ -86,7 +86,9 @@
           </a:prstGeom>
         </p:spPr>
         <p:txBody>
-          <a:bodyPr lIns="0" rIns="0" tIns="0" bIns="0" anchor="ctr"/>
+          <a:bodyPr lIns="0" rIns="0" tIns="0" bIns="0" anchor="ctr">
+            <a:noAutofit/>
+          </a:bodyPr>
           <a:p>
             <a:pPr algn="ctr"/>
             <a:endParaRPr b="0" lang="ru-RU" sz="4400" spc="-1" strike="noStrike">
@@ -197,7 +199,9 @@
           </a:prstGeom>
         </p:spPr>
         <p:txBody>
-          <a:bodyPr lIns="0" rIns="0" tIns="0" bIns="0" anchor="ctr"/>
+          <a:bodyPr lIns="0" rIns="0" tIns="0" bIns="0" anchor="ctr">
+            <a:noAutofit/>
+          </a:bodyPr>
           <a:p>
             <a:pPr algn="ctr"/>
             <a:endParaRPr b="0" lang="ru-RU" sz="4400" spc="-1" strike="noStrike">
@@ -368,7 +372,9 @@
           </a:prstGeom>
         </p:spPr>
         <p:txBody>
-          <a:bodyPr lIns="0" rIns="0" tIns="0" bIns="0" anchor="ctr"/>
+          <a:bodyPr lIns="0" rIns="0" tIns="0" bIns="0" anchor="ctr">
+            <a:noAutofit/>
+          </a:bodyPr>
           <a:p>
             <a:pPr algn="ctr"/>
             <a:endParaRPr b="0" lang="ru-RU" sz="4400" spc="-1" strike="noStrike">
@@ -621,7 +627,9 @@
           </a:prstGeom>
         </p:spPr>
         <p:txBody>
-          <a:bodyPr lIns="0" rIns="0" tIns="0" bIns="0" anchor="ctr"/>
+          <a:bodyPr lIns="0" rIns="0" tIns="0" bIns="0" anchor="ctr">
+            <a:noAutofit/>
+          </a:bodyPr>
           <a:p>
             <a:pPr algn="ctr"/>
             <a:endParaRPr b="0" lang="ru-RU" sz="4400" spc="-1" strike="noStrike">
@@ -650,7 +658,9 @@
           </a:prstGeom>
         </p:spPr>
         <p:txBody>
-          <a:bodyPr lIns="0" rIns="0" tIns="0" bIns="0" anchor="ctr"/>
+          <a:bodyPr lIns="0" rIns="0" tIns="0" bIns="0" anchor="ctr">
+            <a:noAutofit/>
+          </a:bodyPr>
           <a:p>
             <a:pPr algn="ctr"/>
             <a:endParaRPr b="0" lang="ru-RU" sz="3200" spc="-1" strike="noStrike">
@@ -701,7 +711,9 @@
           </a:prstGeom>
         </p:spPr>
         <p:txBody>
-          <a:bodyPr lIns="0" rIns="0" tIns="0" bIns="0" anchor="ctr"/>
+          <a:bodyPr lIns="0" rIns="0" tIns="0" bIns="0" anchor="ctr">
+            <a:noAutofit/>
+          </a:bodyPr>
           <a:p>
             <a:pPr algn="ctr"/>
             <a:endParaRPr b="0" lang="ru-RU" sz="4400" spc="-1" strike="noStrike">
@@ -782,7 +794,9 @@
           </a:prstGeom>
         </p:spPr>
         <p:txBody>
-          <a:bodyPr lIns="0" rIns="0" tIns="0" bIns="0" anchor="ctr"/>
+          <a:bodyPr lIns="0" rIns="0" tIns="0" bIns="0" anchor="ctr">
+            <a:noAutofit/>
+          </a:bodyPr>
           <a:p>
             <a:pPr algn="ctr"/>
             <a:endParaRPr b="0" lang="ru-RU" sz="4400" spc="-1" strike="noStrike">
@@ -893,7 +907,9 @@
           </a:prstGeom>
         </p:spPr>
         <p:txBody>
-          <a:bodyPr lIns="0" rIns="0" tIns="0" bIns="0" anchor="ctr"/>
+          <a:bodyPr lIns="0" rIns="0" tIns="0" bIns="0" anchor="ctr">
+            <a:noAutofit/>
+          </a:bodyPr>
           <a:p>
             <a:pPr algn="ctr"/>
             <a:endParaRPr b="0" lang="ru-RU" sz="4400" spc="-1" strike="noStrike">
@@ -944,7 +960,9 @@
           </a:prstGeom>
         </p:spPr>
         <p:txBody>
-          <a:bodyPr lIns="0" rIns="0" tIns="0" bIns="0" anchor="ctr"/>
+          <a:bodyPr lIns="0" rIns="0" tIns="0" bIns="0" anchor="ctr">
+            <a:noAutofit/>
+          </a:bodyPr>
           <a:p>
             <a:pPr algn="ctr"/>
             <a:endParaRPr b="0" lang="ru-RU" sz="3200" spc="-1" strike="noStrike">
@@ -995,7 +1013,9 @@
           </a:prstGeom>
         </p:spPr>
         <p:txBody>
-          <a:bodyPr lIns="0" rIns="0" tIns="0" bIns="0" anchor="ctr"/>
+          <a:bodyPr lIns="0" rIns="0" tIns="0" bIns="0" anchor="ctr">
+            <a:noAutofit/>
+          </a:bodyPr>
           <a:p>
             <a:pPr algn="ctr"/>
             <a:endParaRPr b="0" lang="ru-RU" sz="4400" spc="-1" strike="noStrike">
@@ -1136,7 +1156,9 @@
           </a:prstGeom>
         </p:spPr>
         <p:txBody>
-          <a:bodyPr lIns="0" rIns="0" tIns="0" bIns="0" anchor="ctr"/>
+          <a:bodyPr lIns="0" rIns="0" tIns="0" bIns="0" anchor="ctr">
+            <a:noAutofit/>
+          </a:bodyPr>
           <a:p>
             <a:pPr algn="ctr"/>
             <a:endParaRPr b="0" lang="ru-RU" sz="4400" spc="-1" strike="noStrike">
@@ -1165,7 +1187,9 @@
           </a:prstGeom>
         </p:spPr>
         <p:txBody>
-          <a:bodyPr lIns="0" rIns="0" tIns="0" bIns="0" anchor="ctr"/>
+          <a:bodyPr lIns="0" rIns="0" tIns="0" bIns="0" anchor="ctr">
+            <a:noAutofit/>
+          </a:bodyPr>
           <a:p>
             <a:pPr algn="ctr"/>
             <a:endParaRPr b="0" lang="ru-RU" sz="3200" spc="-1" strike="noStrike">
@@ -1216,7 +1240,9 @@
           </a:prstGeom>
         </p:spPr>
         <p:txBody>
-          <a:bodyPr lIns="0" rIns="0" tIns="0" bIns="0" anchor="ctr"/>
+          <a:bodyPr lIns="0" rIns="0" tIns="0" bIns="0" anchor="ctr">
+            <a:noAutofit/>
+          </a:bodyPr>
           <a:p>
             <a:pPr algn="ctr"/>
             <a:endParaRPr b="0" lang="ru-RU" sz="4400" spc="-1" strike="noStrike">
@@ -1357,7 +1383,9 @@
           </a:prstGeom>
         </p:spPr>
         <p:txBody>
-          <a:bodyPr lIns="0" rIns="0" tIns="0" bIns="0" anchor="ctr"/>
+          <a:bodyPr lIns="0" rIns="0" tIns="0" bIns="0" anchor="ctr">
+            <a:noAutofit/>
+          </a:bodyPr>
           <a:p>
             <a:pPr algn="ctr"/>
             <a:endParaRPr b="0" lang="ru-RU" sz="4400" spc="-1" strike="noStrike">
@@ -1498,7 +1526,9 @@
           </a:prstGeom>
         </p:spPr>
         <p:txBody>
-          <a:bodyPr lIns="0" rIns="0" tIns="0" bIns="0" anchor="ctr"/>
+          <a:bodyPr lIns="0" rIns="0" tIns="0" bIns="0" anchor="ctr">
+            <a:noAutofit/>
+          </a:bodyPr>
           <a:p>
             <a:pPr algn="ctr"/>
             <a:endParaRPr b="0" lang="ru-RU" sz="4400" spc="-1" strike="noStrike">
@@ -1609,7 +1639,9 @@
           </a:prstGeom>
         </p:spPr>
         <p:txBody>
-          <a:bodyPr lIns="0" rIns="0" tIns="0" bIns="0" anchor="ctr"/>
+          <a:bodyPr lIns="0" rIns="0" tIns="0" bIns="0" anchor="ctr">
+            <a:noAutofit/>
+          </a:bodyPr>
           <a:p>
             <a:pPr algn="ctr"/>
             <a:endParaRPr b="0" lang="ru-RU" sz="4400" spc="-1" strike="noStrike">
@@ -1780,7 +1812,9 @@
           </a:prstGeom>
         </p:spPr>
         <p:txBody>
-          <a:bodyPr lIns="0" rIns="0" tIns="0" bIns="0" anchor="ctr"/>
+          <a:bodyPr lIns="0" rIns="0" tIns="0" bIns="0" anchor="ctr">
+            <a:noAutofit/>
+          </a:bodyPr>
           <a:p>
             <a:pPr algn="ctr"/>
             <a:endParaRPr b="0" lang="ru-RU" sz="4400" spc="-1" strike="noStrike">
@@ -2033,7 +2067,9 @@
           </a:prstGeom>
         </p:spPr>
         <p:txBody>
-          <a:bodyPr lIns="0" rIns="0" tIns="0" bIns="0" anchor="ctr"/>
+          <a:bodyPr lIns="0" rIns="0" tIns="0" bIns="0" anchor="ctr">
+            <a:noAutofit/>
+          </a:bodyPr>
           <a:p>
             <a:pPr algn="ctr"/>
             <a:endParaRPr b="0" lang="ru-RU" sz="4400" spc="-1" strike="noStrike">
@@ -2062,7 +2098,9 @@
           </a:prstGeom>
         </p:spPr>
         <p:txBody>
-          <a:bodyPr lIns="0" rIns="0" tIns="0" bIns="0" anchor="ctr"/>
+          <a:bodyPr lIns="0" rIns="0" tIns="0" bIns="0" anchor="ctr">
+            <a:noAutofit/>
+          </a:bodyPr>
           <a:p>
             <a:pPr algn="ctr"/>
             <a:endParaRPr b="0" lang="ru-RU" sz="3200" spc="-1" strike="noStrike">
@@ -2113,7 +2151,9 @@
           </a:prstGeom>
         </p:spPr>
         <p:txBody>
-          <a:bodyPr lIns="0" rIns="0" tIns="0" bIns="0" anchor="ctr"/>
+          <a:bodyPr lIns="0" rIns="0" tIns="0" bIns="0" anchor="ctr">
+            <a:noAutofit/>
+          </a:bodyPr>
           <a:p>
             <a:pPr algn="ctr"/>
             <a:endParaRPr b="0" lang="ru-RU" sz="4400" spc="-1" strike="noStrike">
@@ -2194,7 +2234,9 @@
           </a:prstGeom>
         </p:spPr>
         <p:txBody>
-          <a:bodyPr lIns="0" rIns="0" tIns="0" bIns="0" anchor="ctr"/>
+          <a:bodyPr lIns="0" rIns="0" tIns="0" bIns="0" anchor="ctr">
+            <a:noAutofit/>
+          </a:bodyPr>
           <a:p>
             <a:pPr algn="ctr"/>
             <a:endParaRPr b="0" lang="ru-RU" sz="4400" spc="-1" strike="noStrike">
@@ -2305,7 +2347,9 @@
           </a:prstGeom>
         </p:spPr>
         <p:txBody>
-          <a:bodyPr lIns="0" rIns="0" tIns="0" bIns="0" anchor="ctr"/>
+          <a:bodyPr lIns="0" rIns="0" tIns="0" bIns="0" anchor="ctr">
+            <a:noAutofit/>
+          </a:bodyPr>
           <a:p>
             <a:pPr algn="ctr"/>
             <a:endParaRPr b="0" lang="ru-RU" sz="4400" spc="-1" strike="noStrike">
@@ -2356,7 +2400,9 @@
           </a:prstGeom>
         </p:spPr>
         <p:txBody>
-          <a:bodyPr lIns="0" rIns="0" tIns="0" bIns="0" anchor="ctr"/>
+          <a:bodyPr lIns="0" rIns="0" tIns="0" bIns="0" anchor="ctr">
+            <a:noAutofit/>
+          </a:bodyPr>
           <a:p>
             <a:pPr algn="ctr"/>
             <a:endParaRPr b="0" lang="ru-RU" sz="4400" spc="-1" strike="noStrike">
@@ -2437,7 +2483,9 @@
           </a:prstGeom>
         </p:spPr>
         <p:txBody>
-          <a:bodyPr lIns="0" rIns="0" tIns="0" bIns="0" anchor="ctr"/>
+          <a:bodyPr lIns="0" rIns="0" tIns="0" bIns="0" anchor="ctr">
+            <a:noAutofit/>
+          </a:bodyPr>
           <a:p>
             <a:pPr algn="ctr"/>
             <a:endParaRPr b="0" lang="ru-RU" sz="3200" spc="-1" strike="noStrike">
@@ -2488,7 +2536,9 @@
           </a:prstGeom>
         </p:spPr>
         <p:txBody>
-          <a:bodyPr lIns="0" rIns="0" tIns="0" bIns="0" anchor="ctr"/>
+          <a:bodyPr lIns="0" rIns="0" tIns="0" bIns="0" anchor="ctr">
+            <a:noAutofit/>
+          </a:bodyPr>
           <a:p>
             <a:pPr algn="ctr"/>
             <a:endParaRPr b="0" lang="ru-RU" sz="4400" spc="-1" strike="noStrike">
@@ -2629,7 +2679,9 @@
           </a:prstGeom>
         </p:spPr>
         <p:txBody>
-          <a:bodyPr lIns="0" rIns="0" tIns="0" bIns="0" anchor="ctr"/>
+          <a:bodyPr lIns="0" rIns="0" tIns="0" bIns="0" anchor="ctr">
+            <a:noAutofit/>
+          </a:bodyPr>
           <a:p>
             <a:pPr algn="ctr"/>
             <a:endParaRPr b="0" lang="ru-RU" sz="4400" spc="-1" strike="noStrike">
@@ -2770,7 +2822,9 @@
           </a:prstGeom>
         </p:spPr>
         <p:txBody>
-          <a:bodyPr lIns="0" rIns="0" tIns="0" bIns="0" anchor="ctr"/>
+          <a:bodyPr lIns="0" rIns="0" tIns="0" bIns="0" anchor="ctr">
+            <a:noAutofit/>
+          </a:bodyPr>
           <a:p>
             <a:pPr algn="ctr"/>
             <a:endParaRPr b="0" lang="ru-RU" sz="4400" spc="-1" strike="noStrike">
@@ -2911,7 +2965,9 @@
           </a:prstGeom>
         </p:spPr>
         <p:txBody>
-          <a:bodyPr lIns="0" rIns="0" tIns="0" bIns="0" anchor="ctr"/>
+          <a:bodyPr lIns="0" rIns="0" tIns="0" bIns="0" anchor="ctr">
+            <a:noAutofit/>
+          </a:bodyPr>
           <a:p>
             <a:pPr algn="ctr"/>
             <a:endParaRPr b="0" lang="ru-RU" sz="4400" spc="-1" strike="noStrike">
@@ -3022,7 +3078,9 @@
           </a:prstGeom>
         </p:spPr>
         <p:txBody>
-          <a:bodyPr lIns="0" rIns="0" tIns="0" bIns="0" anchor="ctr"/>
+          <a:bodyPr lIns="0" rIns="0" tIns="0" bIns="0" anchor="ctr">
+            <a:noAutofit/>
+          </a:bodyPr>
           <a:p>
             <a:pPr algn="ctr"/>
             <a:endParaRPr b="0" lang="ru-RU" sz="4400" spc="-1" strike="noStrike">
@@ -3193,7 +3251,9 @@
           </a:prstGeom>
         </p:spPr>
         <p:txBody>
-          <a:bodyPr lIns="0" rIns="0" tIns="0" bIns="0" anchor="ctr"/>
+          <a:bodyPr lIns="0" rIns="0" tIns="0" bIns="0" anchor="ctr">
+            <a:noAutofit/>
+          </a:bodyPr>
           <a:p>
             <a:pPr algn="ctr"/>
             <a:endParaRPr b="0" lang="ru-RU" sz="4400" spc="-1" strike="noStrike">
@@ -3424,7 +3484,9 @@
           </a:prstGeom>
         </p:spPr>
         <p:txBody>
-          <a:bodyPr lIns="0" rIns="0" tIns="0" bIns="0" anchor="ctr"/>
+          <a:bodyPr lIns="0" rIns="0" tIns="0" bIns="0" anchor="ctr">
+            <a:noAutofit/>
+          </a:bodyPr>
           <a:p>
             <a:pPr algn="ctr"/>
             <a:endParaRPr b="0" lang="ru-RU" sz="4400" spc="-1" strike="noStrike">
@@ -3535,7 +3597,9 @@
           </a:prstGeom>
         </p:spPr>
         <p:txBody>
-          <a:bodyPr lIns="0" rIns="0" tIns="0" bIns="0" anchor="ctr"/>
+          <a:bodyPr lIns="0" rIns="0" tIns="0" bIns="0" anchor="ctr">
+            <a:noAutofit/>
+          </a:bodyPr>
           <a:p>
             <a:pPr algn="ctr"/>
             <a:endParaRPr b="0" lang="ru-RU" sz="4400" spc="-1" strike="noStrike">
@@ -3586,7 +3650,9 @@
           </a:prstGeom>
         </p:spPr>
         <p:txBody>
-          <a:bodyPr lIns="0" rIns="0" tIns="0" bIns="0" anchor="ctr"/>
+          <a:bodyPr lIns="0" rIns="0" tIns="0" bIns="0" anchor="ctr">
+            <a:noAutofit/>
+          </a:bodyPr>
           <a:p>
             <a:pPr algn="ctr"/>
             <a:endParaRPr b="0" lang="ru-RU" sz="3200" spc="-1" strike="noStrike">
@@ -3637,7 +3703,9 @@
           </a:prstGeom>
         </p:spPr>
         <p:txBody>
-          <a:bodyPr lIns="0" rIns="0" tIns="0" bIns="0" anchor="ctr"/>
+          <a:bodyPr lIns="0" rIns="0" tIns="0" bIns="0" anchor="ctr">
+            <a:noAutofit/>
+          </a:bodyPr>
           <a:p>
             <a:pPr algn="ctr"/>
             <a:endParaRPr b="0" lang="ru-RU" sz="4400" spc="-1" strike="noStrike">
@@ -3778,7 +3846,9 @@
           </a:prstGeom>
         </p:spPr>
         <p:txBody>
-          <a:bodyPr lIns="0" rIns="0" tIns="0" bIns="0" anchor="ctr"/>
+          <a:bodyPr lIns="0" rIns="0" tIns="0" bIns="0" anchor="ctr">
+            <a:noAutofit/>
+          </a:bodyPr>
           <a:p>
             <a:pPr algn="ctr"/>
             <a:endParaRPr b="0" lang="ru-RU" sz="4400" spc="-1" strike="noStrike">
@@ -3919,7 +3989,9 @@
           </a:prstGeom>
         </p:spPr>
         <p:txBody>
-          <a:bodyPr lIns="0" rIns="0" tIns="0" bIns="0" anchor="ctr"/>
+          <a:bodyPr lIns="0" rIns="0" tIns="0" bIns="0" anchor="ctr">
+            <a:noAutofit/>
+          </a:bodyPr>
           <a:p>
             <a:pPr algn="ctr"/>
             <a:endParaRPr b="0" lang="ru-RU" sz="4400" spc="-1" strike="noStrike">
@@ -4063,22 +4135,25 @@
         <p:spPr>
           <a:xfrm>
             <a:off x="599760" y="301320"/>
-            <a:ext cx="10797840" cy="1261440"/>
-          </a:xfrm>
-          <a:prstGeom prst="rect">
-            <a:avLst/>
-          </a:prstGeom>
-        </p:spPr>
-        <p:txBody>
-          <a:bodyPr lIns="0" rIns="0" tIns="0" bIns="0" anchor="ctr"/>
-          <a:p>
-            <a:r>
-              <a:rPr b="0" lang="ru-RU" sz="1800" spc="-1" strike="noStrike">
+            <a:ext cx="10798200" cy="1261800"/>
+          </a:xfrm>
+          <a:prstGeom prst="rect">
+            <a:avLst/>
+          </a:prstGeom>
+        </p:spPr>
+        <p:txBody>
+          <a:bodyPr lIns="0" rIns="0" tIns="0" bIns="0" anchor="ctr">
+            <a:noAutofit/>
+          </a:bodyPr>
+          <a:p>
+            <a:pPr algn="ctr"/>
+            <a:r>
+              <a:rPr b="0" lang="ru-RU" sz="4400" spc="-1" strike="noStrike">
                 <a:latin typeface="Arial"/>
               </a:rPr>
-              <a:t>Для правки текста заглавия щёлкните мышью</a:t>
-            </a:r>
-            <a:endParaRPr b="0" lang="ru-RU" sz="1800" spc="-1" strike="noStrike">
+              <a:t>Click to edit the title text format</a:t>
+            </a:r>
+            <a:endParaRPr b="0" lang="ru-RU" sz="4400" spc="-1" strike="noStrike">
               <a:latin typeface="Arial"/>
             </a:endParaRPr>
           </a:p>
@@ -4097,7 +4172,7 @@
         <p:spPr>
           <a:xfrm>
             <a:off x="599760" y="1768680"/>
-            <a:ext cx="10797840" cy="4383720"/>
+            <a:ext cx="10798200" cy="4384080"/>
           </a:xfrm>
           <a:prstGeom prst="rect">
             <a:avLst/>
@@ -4120,12 +4195,12 @@
               <a:buChar char=""/>
             </a:pPr>
             <a:r>
-              <a:rPr b="0" lang="ru-RU" sz="1800" spc="-1" strike="noStrike">
+              <a:rPr b="0" lang="ru-RU" sz="3200" spc="-1" strike="noStrike">
                 <a:latin typeface="Arial"/>
               </a:rPr>
-              <a:t>Для правки структуры щёлкните мышью</a:t>
-            </a:r>
-            <a:endParaRPr b="0" lang="ru-RU" sz="1800" spc="-1" strike="noStrike">
+              <a:t>Click to edit the outline text format</a:t>
+            </a:r>
+            <a:endParaRPr b="0" lang="ru-RU" sz="3200" spc="-1" strike="noStrike">
               <a:latin typeface="Arial"/>
             </a:endParaRPr>
           </a:p>
@@ -4142,12 +4217,12 @@
               <a:buChar char=""/>
             </a:pPr>
             <a:r>
-              <a:rPr b="0" lang="ru-RU" sz="1800" spc="-1" strike="noStrike">
+              <a:rPr b="0" lang="ru-RU" sz="2800" spc="-1" strike="noStrike">
                 <a:latin typeface="Arial"/>
               </a:rPr>
-              <a:t>Второй уровень структуры</a:t>
-            </a:r>
-            <a:endParaRPr b="0" lang="ru-RU" sz="1800" spc="-1" strike="noStrike">
+              <a:t>Second Outline Level</a:t>
+            </a:r>
+            <a:endParaRPr b="0" lang="ru-RU" sz="2800" spc="-1" strike="noStrike">
               <a:latin typeface="Arial"/>
             </a:endParaRPr>
           </a:p>
@@ -4164,12 +4239,12 @@
               <a:buChar char=""/>
             </a:pPr>
             <a:r>
-              <a:rPr b="0" lang="ru-RU" sz="1800" spc="-1" strike="noStrike">
+              <a:rPr b="0" lang="ru-RU" sz="2400" spc="-1" strike="noStrike">
                 <a:latin typeface="Arial"/>
               </a:rPr>
-              <a:t>Третий уровень структуры</a:t>
-            </a:r>
-            <a:endParaRPr b="0" lang="ru-RU" sz="1800" spc="-1" strike="noStrike">
+              <a:t>Third Outline Level</a:t>
+            </a:r>
+            <a:endParaRPr b="0" lang="ru-RU" sz="2400" spc="-1" strike="noStrike">
               <a:latin typeface="Arial"/>
             </a:endParaRPr>
           </a:p>
@@ -4186,12 +4261,12 @@
               <a:buChar char=""/>
             </a:pPr>
             <a:r>
-              <a:rPr b="0" lang="ru-RU" sz="1800" spc="-1" strike="noStrike">
+              <a:rPr b="0" lang="ru-RU" sz="2000" spc="-1" strike="noStrike">
                 <a:latin typeface="Arial"/>
               </a:rPr>
-              <a:t>Четвёртый уровень структуры</a:t>
-            </a:r>
-            <a:endParaRPr b="0" lang="ru-RU" sz="1800" spc="-1" strike="noStrike">
+              <a:t>Fourth Outline Level</a:t>
+            </a:r>
+            <a:endParaRPr b="0" lang="ru-RU" sz="2000" spc="-1" strike="noStrike">
               <a:latin typeface="Arial"/>
             </a:endParaRPr>
           </a:p>
@@ -4208,12 +4283,12 @@
               <a:buChar char=""/>
             </a:pPr>
             <a:r>
-              <a:rPr b="0" lang="ru-RU" sz="1800" spc="-1" strike="noStrike">
+              <a:rPr b="0" lang="ru-RU" sz="2000" spc="-1" strike="noStrike">
                 <a:latin typeface="Arial"/>
               </a:rPr>
-              <a:t>Пятый уровень структуры</a:t>
-            </a:r>
-            <a:endParaRPr b="0" lang="ru-RU" sz="1800" spc="-1" strike="noStrike">
+              <a:t>Fifth Outline Level</a:t>
+            </a:r>
+            <a:endParaRPr b="0" lang="ru-RU" sz="2000" spc="-1" strike="noStrike">
               <a:latin typeface="Arial"/>
             </a:endParaRPr>
           </a:p>
@@ -4230,12 +4305,12 @@
               <a:buChar char=""/>
             </a:pPr>
             <a:r>
-              <a:rPr b="0" lang="ru-RU" sz="1800" spc="-1" strike="noStrike">
+              <a:rPr b="0" lang="ru-RU" sz="2000" spc="-1" strike="noStrike">
                 <a:latin typeface="Arial"/>
               </a:rPr>
-              <a:t>Шестой уровень структуры</a:t>
-            </a:r>
-            <a:endParaRPr b="0" lang="ru-RU" sz="1800" spc="-1" strike="noStrike">
+              <a:t>Sixth Outline Level</a:t>
+            </a:r>
+            <a:endParaRPr b="0" lang="ru-RU" sz="2000" spc="-1" strike="noStrike">
               <a:latin typeface="Arial"/>
             </a:endParaRPr>
           </a:p>
@@ -4252,12 +4327,12 @@
               <a:buChar char=""/>
             </a:pPr>
             <a:r>
-              <a:rPr b="0" lang="ru-RU" sz="1800" spc="-1" strike="noStrike">
+              <a:rPr b="0" lang="ru-RU" sz="2000" spc="-1" strike="noStrike">
                 <a:latin typeface="Arial"/>
               </a:rPr>
-              <a:t>Седьмой уровень структуры</a:t>
-            </a:r>
-            <a:endParaRPr b="0" lang="ru-RU" sz="1800" spc="-1" strike="noStrike">
+              <a:t>Seventh Outline Level</a:t>
+            </a:r>
+            <a:endParaRPr b="0" lang="ru-RU" sz="2000" spc="-1" strike="noStrike">
               <a:latin typeface="Arial"/>
             </a:endParaRPr>
           </a:p>
@@ -4330,14 +4405,16 @@
           </a:prstGeom>
         </p:spPr>
         <p:txBody>
-          <a:bodyPr lIns="0" rIns="0" tIns="0" bIns="0" anchor="ctr"/>
+          <a:bodyPr lIns="0" rIns="0" tIns="0" bIns="0" anchor="ctr">
+            <a:noAutofit/>
+          </a:bodyPr>
           <a:p>
             <a:pPr algn="ctr"/>
             <a:r>
               <a:rPr b="0" lang="ru-RU" sz="4400" spc="-1" strike="noStrike">
                 <a:latin typeface="Arial"/>
               </a:rPr>
-              <a:t>Для правки текста заглавия щёлкните мышью</a:t>
+              <a:t>Click to edit the title text format</a:t>
             </a:r>
             <a:endParaRPr b="0" lang="ru-RU" sz="4400" spc="-1" strike="noStrike">
               <a:latin typeface="Arial"/>
@@ -4384,7 +4461,7 @@
               <a:rPr b="0" lang="ru-RU" sz="3200" spc="-1" strike="noStrike">
                 <a:latin typeface="Arial"/>
               </a:rPr>
-              <a:t>Для правки структуры щёлкните мышью</a:t>
+              <a:t>Click to edit the outline text format</a:t>
             </a:r>
             <a:endParaRPr b="0" lang="ru-RU" sz="3200" spc="-1" strike="noStrike">
               <a:latin typeface="Arial"/>
@@ -4406,7 +4483,7 @@
               <a:rPr b="0" lang="ru-RU" sz="2800" spc="-1" strike="noStrike">
                 <a:latin typeface="Arial"/>
               </a:rPr>
-              <a:t>Второй уровень структуры</a:t>
+              <a:t>Second Outline Level</a:t>
             </a:r>
             <a:endParaRPr b="0" lang="ru-RU" sz="2800" spc="-1" strike="noStrike">
               <a:latin typeface="Arial"/>
@@ -4428,7 +4505,7 @@
               <a:rPr b="0" lang="ru-RU" sz="2400" spc="-1" strike="noStrike">
                 <a:latin typeface="Arial"/>
               </a:rPr>
-              <a:t>Третий уровень структуры</a:t>
+              <a:t>Third Outline Level</a:t>
             </a:r>
             <a:endParaRPr b="0" lang="ru-RU" sz="2400" spc="-1" strike="noStrike">
               <a:latin typeface="Arial"/>
@@ -4450,7 +4527,7 @@
               <a:rPr b="0" lang="ru-RU" sz="2000" spc="-1" strike="noStrike">
                 <a:latin typeface="Arial"/>
               </a:rPr>
-              <a:t>Четвёртый уровень структуры</a:t>
+              <a:t>Fourth Outline Level</a:t>
             </a:r>
             <a:endParaRPr b="0" lang="ru-RU" sz="2000" spc="-1" strike="noStrike">
               <a:latin typeface="Arial"/>
@@ -4472,7 +4549,7 @@
               <a:rPr b="0" lang="ru-RU" sz="2000" spc="-1" strike="noStrike">
                 <a:latin typeface="Arial"/>
               </a:rPr>
-              <a:t>Пятый уровень структуры</a:t>
+              <a:t>Fifth Outline Level</a:t>
             </a:r>
             <a:endParaRPr b="0" lang="ru-RU" sz="2000" spc="-1" strike="noStrike">
               <a:latin typeface="Arial"/>
@@ -4494,7 +4571,7 @@
               <a:rPr b="0" lang="ru-RU" sz="2000" spc="-1" strike="noStrike">
                 <a:latin typeface="Arial"/>
               </a:rPr>
-              <a:t>Шестой уровень структуры</a:t>
+              <a:t>Sixth Outline Level</a:t>
             </a:r>
             <a:endParaRPr b="0" lang="ru-RU" sz="2000" spc="-1" strike="noStrike">
               <a:latin typeface="Arial"/>
@@ -4516,7 +4593,7 @@
               <a:rPr b="0" lang="ru-RU" sz="2000" spc="-1" strike="noStrike">
                 <a:latin typeface="Arial"/>
               </a:rPr>
-              <a:t>Седьмой уровень структуры</a:t>
+              <a:t>Seventh Outline Level</a:t>
             </a:r>
             <a:endParaRPr b="0" lang="ru-RU" sz="2000" spc="-1" strike="noStrike">
               <a:latin typeface="Arial"/>
@@ -4591,14 +4668,16 @@
           </a:prstGeom>
         </p:spPr>
         <p:txBody>
-          <a:bodyPr lIns="0" rIns="0" tIns="0" bIns="0" anchor="ctr"/>
+          <a:bodyPr lIns="0" rIns="0" tIns="0" bIns="0" anchor="ctr">
+            <a:noAutofit/>
+          </a:bodyPr>
           <a:p>
             <a:pPr algn="ctr"/>
             <a:r>
               <a:rPr b="0" lang="ru-RU" sz="4400" spc="-1" strike="noStrike">
                 <a:latin typeface="Arial"/>
               </a:rPr>
-              <a:t>Для правки текста заглавия щёлкните мышью</a:t>
+              <a:t>Click to edit the title text format</a:t>
             </a:r>
             <a:endParaRPr b="0" lang="ru-RU" sz="4400" spc="-1" strike="noStrike">
               <a:latin typeface="Arial"/>
@@ -4645,7 +4724,7 @@
               <a:rPr b="0" lang="ru-RU" sz="3200" spc="-1" strike="noStrike">
                 <a:latin typeface="Arial"/>
               </a:rPr>
-              <a:t>Для правки структуры щёлкните мышью</a:t>
+              <a:t>Click to edit the outline text format</a:t>
             </a:r>
             <a:endParaRPr b="0" lang="ru-RU" sz="3200" spc="-1" strike="noStrike">
               <a:latin typeface="Arial"/>
@@ -4667,7 +4746,7 @@
               <a:rPr b="0" lang="ru-RU" sz="2800" spc="-1" strike="noStrike">
                 <a:latin typeface="Arial"/>
               </a:rPr>
-              <a:t>Второй уровень структуры</a:t>
+              <a:t>Second Outline Level</a:t>
             </a:r>
             <a:endParaRPr b="0" lang="ru-RU" sz="2800" spc="-1" strike="noStrike">
               <a:latin typeface="Arial"/>
@@ -4689,7 +4768,7 @@
               <a:rPr b="0" lang="ru-RU" sz="2400" spc="-1" strike="noStrike">
                 <a:latin typeface="Arial"/>
               </a:rPr>
-              <a:t>Третий уровень структуры</a:t>
+              <a:t>Third Outline Level</a:t>
             </a:r>
             <a:endParaRPr b="0" lang="ru-RU" sz="2400" spc="-1" strike="noStrike">
               <a:latin typeface="Arial"/>
@@ -4711,7 +4790,7 @@
               <a:rPr b="0" lang="ru-RU" sz="2000" spc="-1" strike="noStrike">
                 <a:latin typeface="Arial"/>
               </a:rPr>
-              <a:t>Четвёртый уровень структуры</a:t>
+              <a:t>Fourth Outline Level</a:t>
             </a:r>
             <a:endParaRPr b="0" lang="ru-RU" sz="2000" spc="-1" strike="noStrike">
               <a:latin typeface="Arial"/>
@@ -4733,7 +4812,7 @@
               <a:rPr b="0" lang="ru-RU" sz="2000" spc="-1" strike="noStrike">
                 <a:latin typeface="Arial"/>
               </a:rPr>
-              <a:t>Пятый уровень структуры</a:t>
+              <a:t>Fifth Outline Level</a:t>
             </a:r>
             <a:endParaRPr b="0" lang="ru-RU" sz="2000" spc="-1" strike="noStrike">
               <a:latin typeface="Arial"/>
@@ -4755,7 +4834,7 @@
               <a:rPr b="0" lang="ru-RU" sz="2000" spc="-1" strike="noStrike">
                 <a:latin typeface="Arial"/>
               </a:rPr>
-              <a:t>Шестой уровень структуры</a:t>
+              <a:t>Sixth Outline Level</a:t>
             </a:r>
             <a:endParaRPr b="0" lang="ru-RU" sz="2000" spc="-1" strike="noStrike">
               <a:latin typeface="Arial"/>
@@ -4777,7 +4856,7 @@
               <a:rPr b="0" lang="ru-RU" sz="2000" spc="-1" strike="noStrike">
                 <a:latin typeface="Arial"/>
               </a:rPr>
-              <a:t>Седьмой уровень структуры</a:t>
+              <a:t>Seventh Outline Level</a:t>
             </a:r>
             <a:endParaRPr b="0" lang="ru-RU" sz="2000" spc="-1" strike="noStrike">
               <a:latin typeface="Arial"/>
@@ -4831,7 +4910,7 @@
         <p:spPr>
           <a:xfrm>
             <a:off x="548640" y="301320"/>
-            <a:ext cx="10797840" cy="4452840"/>
+            <a:ext cx="10797480" cy="4452480"/>
           </a:xfrm>
           <a:prstGeom prst="rect">
             <a:avLst/>
@@ -4852,6 +4931,11 @@
             <a:normAutofit/>
           </a:bodyPr>
           <a:p>
+            <a:pPr>
+              <a:lnSpc>
+                <a:spcPct val="100000"/>
+              </a:lnSpc>
+            </a:pPr>
             <a:r>
               <a:rPr b="0" lang="ru-RU" sz="8000" spc="-1" strike="noStrike">
                 <a:solidFill>
@@ -4877,7 +4961,7 @@
         <p:spPr>
           <a:xfrm>
             <a:off x="552960" y="5216400"/>
-            <a:ext cx="10789200" cy="1549440"/>
+            <a:ext cx="10788840" cy="1549080"/>
           </a:xfrm>
           <a:prstGeom prst="rect">
             <a:avLst/>
@@ -4894,8 +4978,15 @@
           <a:fontRef idx="minor"/>
         </p:style>
         <p:txBody>
-          <a:bodyPr lIns="0" rIns="0" tIns="0" bIns="0"/>
-          <a:p>
+          <a:bodyPr lIns="0" rIns="0" tIns="0" bIns="0">
+            <a:noAutofit/>
+          </a:bodyPr>
+          <a:p>
+            <a:pPr>
+              <a:lnSpc>
+                <a:spcPct val="100000"/>
+              </a:lnSpc>
+            </a:pPr>
             <a:r>
               <a:rPr b="1" lang="ru-RU" sz="3600" spc="-1" strike="noStrike">
                 <a:solidFill>
@@ -4911,6 +5002,11 @@
             </a:endParaRPr>
           </a:p>
           <a:p>
+            <a:pPr>
+              <a:lnSpc>
+                <a:spcPct val="100000"/>
+              </a:lnSpc>
+            </a:pPr>
             <a:r>
               <a:rPr b="1" lang="ru-RU" sz="3600" spc="-1" strike="noStrike">
                 <a:solidFill>
@@ -4919,7 +5015,7 @@
                 <a:latin typeface="Source Sans Pro"/>
                 <a:ea typeface="DejaVu Sans"/>
               </a:rPr>
-              <a:t>Пешехонов К. А., 08.10.2018</a:t>
+              <a:t>Пешехонов К. А., 30.09.2020</a:t>
             </a:r>
             <a:endParaRPr b="0" lang="ru-RU" sz="3600" spc="-1" strike="noStrike">
               <a:latin typeface="Arial"/>
@@ -4929,33 +5025,14 @@
       </p:sp>
     </p:spTree>
   </p:cSld>
-  <p:timing>
-    <p:tnLst>
-      <p:par>
-        <p:cTn id="1" dur="indefinite" restart="never" nodeType="tmRoot">
-          <p:childTnLst>
-            <p:seq>
-              <p:cTn id="2" dur="indefinite" nodeType="mainSeq"/>
-              <p:prevCondLst>
-                <p:cond delay="0" evt="onPrev">
-                  <p:tgtEl>
-                    <p:sldTgt/>
-                  </p:tgtEl>
-                </p:cond>
-              </p:prevCondLst>
-              <p:nextCondLst>
-                <p:cond delay="0" evt="onNext">
-                  <p:tgtEl>
-                    <p:sldTgt/>
-                  </p:tgtEl>
-                </p:cond>
-              </p:nextCondLst>
-            </p:seq>
-          </p:childTnLst>
-        </p:cTn>
-      </p:par>
-    </p:tnLst>
-  </p:timing>
+  <mc:AlternateContent>
+    <mc:Choice Requires="p14">
+      <p:transition spd="slow" p14:dur="2000"/>
+    </mc:Choice>
+    <mc:Fallback>
+      <p:transition spd="slow"/>
+    </mc:Fallback>
+  </mc:AlternateContent>
 </p:sld>
 </file>
 
@@ -4985,7 +5062,7 @@
         <p:spPr>
           <a:xfrm>
             <a:off x="599040" y="121320"/>
-            <a:ext cx="10797840" cy="1261440"/>
+            <a:ext cx="10797480" cy="1261080"/>
           </a:xfrm>
           <a:prstGeom prst="rect">
             <a:avLst/>
@@ -5003,9 +5080,14 @@
         </p:style>
         <p:txBody>
           <a:bodyPr lIns="0" rIns="0" tIns="0" bIns="0" anchor="b">
-            <a:normAutofit/>
-          </a:bodyPr>
-          <a:p>
+            <a:normAutofit fontScale="52000"/>
+          </a:bodyPr>
+          <a:p>
+            <a:pPr>
+              <a:lnSpc>
+                <a:spcPct val="100000"/>
+              </a:lnSpc>
+            </a:pPr>
             <a:r>
               <a:rPr b="0" lang="ru-RU" sz="6000" spc="-1" strike="noStrike">
                 <a:solidFill>
@@ -5031,7 +5113,7 @@
         <p:spPr>
           <a:xfrm>
             <a:off x="504000" y="1888920"/>
-            <a:ext cx="4247640" cy="4950720"/>
+            <a:ext cx="4247280" cy="4950360"/>
           </a:xfrm>
           <a:prstGeom prst="rect">
             <a:avLst/>
@@ -5049,10 +5131,10 @@
         </p:style>
         <p:txBody>
           <a:bodyPr lIns="0" rIns="0" tIns="0" bIns="0">
-            <a:normAutofit/>
-          </a:bodyPr>
-          <a:p>
-            <a:pPr marL="432000" indent="-323280">
+            <a:normAutofit fontScale="41000"/>
+          </a:bodyPr>
+          <a:p>
+            <a:pPr marL="432000" indent="-322920">
               <a:lnSpc>
                 <a:spcPct val="100000"/>
               </a:lnSpc>
@@ -5081,7 +5163,7 @@
             </a:endParaRPr>
           </a:p>
           <a:p>
-            <a:pPr marL="432000" indent="-323280">
+            <a:pPr marL="432000" indent="-322920">
               <a:lnSpc>
                 <a:spcPct val="100000"/>
               </a:lnSpc>
@@ -5124,7 +5206,7 @@
         <p:spPr>
           <a:xfrm>
             <a:off x="5040000" y="1924200"/>
-            <a:ext cx="6310080" cy="4967640"/>
+            <a:ext cx="6309720" cy="4967280"/>
           </a:xfrm>
           <a:prstGeom prst="rect">
             <a:avLst/>
@@ -5136,33 +5218,14 @@
       </p:pic>
     </p:spTree>
   </p:cSld>
-  <p:timing>
-    <p:tnLst>
-      <p:par>
-        <p:cTn id="19" dur="indefinite" restart="never" nodeType="tmRoot">
-          <p:childTnLst>
-            <p:seq>
-              <p:cTn id="20" dur="indefinite" nodeType="mainSeq"/>
-              <p:prevCondLst>
-                <p:cond delay="0" evt="onPrev">
-                  <p:tgtEl>
-                    <p:sldTgt/>
-                  </p:tgtEl>
-                </p:cond>
-              </p:prevCondLst>
-              <p:nextCondLst>
-                <p:cond delay="0" evt="onNext">
-                  <p:tgtEl>
-                    <p:sldTgt/>
-                  </p:tgtEl>
-                </p:cond>
-              </p:nextCondLst>
-            </p:seq>
-          </p:childTnLst>
-        </p:cTn>
-      </p:par>
-    </p:tnLst>
-  </p:timing>
+  <mc:AlternateContent>
+    <mc:Choice Requires="p14">
+      <p:transition spd="slow" p14:dur="2000"/>
+    </mc:Choice>
+    <mc:Fallback>
+      <p:transition spd="slow"/>
+    </mc:Fallback>
+  </mc:AlternateContent>
 </p:sld>
 </file>
 
@@ -5192,7 +5255,7 @@
         <p:spPr>
           <a:xfrm>
             <a:off x="599040" y="121320"/>
-            <a:ext cx="10797840" cy="1261440"/>
+            <a:ext cx="10797480" cy="1261080"/>
           </a:xfrm>
           <a:prstGeom prst="rect">
             <a:avLst/>
@@ -5213,6 +5276,11 @@
             <a:normAutofit/>
           </a:bodyPr>
           <a:p>
+            <a:pPr>
+              <a:lnSpc>
+                <a:spcPct val="100000"/>
+              </a:lnSpc>
+            </a:pPr>
             <a:r>
               <a:rPr b="0" lang="ru-RU" sz="6000" spc="-1" strike="noStrike">
                 <a:solidFill>
@@ -5238,7 +5306,7 @@
         <p:spPr>
           <a:xfrm>
             <a:off x="504000" y="1888920"/>
-            <a:ext cx="11087640" cy="5022720"/>
+            <a:ext cx="11087280" cy="5022360"/>
           </a:xfrm>
           <a:prstGeom prst="rect">
             <a:avLst/>
@@ -5259,7 +5327,7 @@
             <a:normAutofit/>
           </a:bodyPr>
           <a:p>
-            <a:pPr marL="432000" indent="-323280">
+            <a:pPr marL="432000" indent="-322920">
               <a:lnSpc>
                 <a:spcPct val="100000"/>
               </a:lnSpc>
@@ -5288,7 +5356,7 @@
             </a:endParaRPr>
           </a:p>
           <a:p>
-            <a:pPr marL="432000" indent="-323280">
+            <a:pPr marL="432000" indent="-322920">
               <a:lnSpc>
                 <a:spcPct val="100000"/>
               </a:lnSpc>
@@ -5317,7 +5385,7 @@
             </a:endParaRPr>
           </a:p>
           <a:p>
-            <a:pPr marL="432000" indent="-323280">
+            <a:pPr marL="432000" indent="-322920">
               <a:lnSpc>
                 <a:spcPct val="100000"/>
               </a:lnSpc>
@@ -5346,7 +5414,7 @@
             </a:endParaRPr>
           </a:p>
           <a:p>
-            <a:pPr marL="432000" indent="-323280">
+            <a:pPr marL="432000" indent="-322920">
               <a:lnSpc>
                 <a:spcPct val="100000"/>
               </a:lnSpc>
@@ -5375,7 +5443,7 @@
             </a:endParaRPr>
           </a:p>
           <a:p>
-            <a:pPr marL="432000" indent="-323280">
+            <a:pPr marL="432000" indent="-322920">
               <a:lnSpc>
                 <a:spcPct val="100000"/>
               </a:lnSpc>
@@ -5407,33 +5475,14 @@
       </p:sp>
     </p:spTree>
   </p:cSld>
-  <p:timing>
-    <p:tnLst>
-      <p:par>
-        <p:cTn id="21" dur="indefinite" restart="never" nodeType="tmRoot">
-          <p:childTnLst>
-            <p:seq>
-              <p:cTn id="22" dur="indefinite" nodeType="mainSeq"/>
-              <p:prevCondLst>
-                <p:cond delay="0" evt="onPrev">
-                  <p:tgtEl>
-                    <p:sldTgt/>
-                  </p:tgtEl>
-                </p:cond>
-              </p:prevCondLst>
-              <p:nextCondLst>
-                <p:cond delay="0" evt="onNext">
-                  <p:tgtEl>
-                    <p:sldTgt/>
-                  </p:tgtEl>
-                </p:cond>
-              </p:nextCondLst>
-            </p:seq>
-          </p:childTnLst>
-        </p:cTn>
-      </p:par>
-    </p:tnLst>
-  </p:timing>
+  <mc:AlternateContent>
+    <mc:Choice Requires="p14">
+      <p:transition spd="slow" p14:dur="2000"/>
+    </mc:Choice>
+    <mc:Fallback>
+      <p:transition spd="slow"/>
+    </mc:Fallback>
+  </mc:AlternateContent>
 </p:sld>
 </file>
 
@@ -5463,7 +5512,7 @@
         <p:spPr>
           <a:xfrm>
             <a:off x="599040" y="121320"/>
-            <a:ext cx="10797840" cy="1261440"/>
+            <a:ext cx="10797480" cy="1261080"/>
           </a:xfrm>
           <a:prstGeom prst="rect">
             <a:avLst/>
@@ -5484,6 +5533,11 @@
             <a:normAutofit/>
           </a:bodyPr>
           <a:p>
+            <a:pPr>
+              <a:lnSpc>
+                <a:spcPct val="100000"/>
+              </a:lnSpc>
+            </a:pPr>
             <a:r>
               <a:rPr b="0" lang="ru-RU" sz="6000" spc="-1" strike="noStrike">
                 <a:solidFill>
@@ -5509,7 +5563,7 @@
         <p:spPr>
           <a:xfrm>
             <a:off x="504000" y="1888920"/>
-            <a:ext cx="11087640" cy="5022720"/>
+            <a:ext cx="11087280" cy="5022360"/>
           </a:xfrm>
           <a:prstGeom prst="rect">
             <a:avLst/>
@@ -5530,7 +5584,7 @@
             <a:normAutofit/>
           </a:bodyPr>
           <a:p>
-            <a:pPr marL="432000" indent="-323280">
+            <a:pPr marL="432000" indent="-322920">
               <a:lnSpc>
                 <a:spcPct val="100000"/>
               </a:lnSpc>
@@ -5561,7 +5615,7 @@
             </a:endParaRPr>
           </a:p>
           <a:p>
-            <a:pPr marL="432000" indent="-323280">
+            <a:pPr marL="432000" indent="-322920">
               <a:lnSpc>
                 <a:spcPct val="100000"/>
               </a:lnSpc>
@@ -5605,33 +5659,14 @@
       </p:sp>
     </p:spTree>
   </p:cSld>
-  <p:timing>
-    <p:tnLst>
-      <p:par>
-        <p:cTn id="23" dur="indefinite" restart="never" nodeType="tmRoot">
-          <p:childTnLst>
-            <p:seq>
-              <p:cTn id="24" dur="indefinite" nodeType="mainSeq"/>
-              <p:prevCondLst>
-                <p:cond delay="0" evt="onPrev">
-                  <p:tgtEl>
-                    <p:sldTgt/>
-                  </p:tgtEl>
-                </p:cond>
-              </p:prevCondLst>
-              <p:nextCondLst>
-                <p:cond delay="0" evt="onNext">
-                  <p:tgtEl>
-                    <p:sldTgt/>
-                  </p:tgtEl>
-                </p:cond>
-              </p:nextCondLst>
-            </p:seq>
-          </p:childTnLst>
-        </p:cTn>
-      </p:par>
-    </p:tnLst>
-  </p:timing>
+  <mc:AlternateContent>
+    <mc:Choice Requires="p14">
+      <p:transition spd="slow" p14:dur="2000"/>
+    </mc:Choice>
+    <mc:Fallback>
+      <p:transition spd="slow"/>
+    </mc:Fallback>
+  </mc:AlternateContent>
 </p:sld>
 </file>
 
@@ -5661,7 +5696,7 @@
         <p:spPr>
           <a:xfrm>
             <a:off x="599040" y="121320"/>
-            <a:ext cx="10797840" cy="1261440"/>
+            <a:ext cx="10797480" cy="1261080"/>
           </a:xfrm>
           <a:prstGeom prst="rect">
             <a:avLst/>
@@ -5682,6 +5717,11 @@
             <a:normAutofit/>
           </a:bodyPr>
           <a:p>
+            <a:pPr>
+              <a:lnSpc>
+                <a:spcPct val="100000"/>
+              </a:lnSpc>
+            </a:pPr>
             <a:r>
               <a:rPr b="0" lang="ru-RU" sz="6000" spc="-1" strike="noStrike">
                 <a:solidFill>
@@ -5707,7 +5747,7 @@
         <p:spPr>
           <a:xfrm>
             <a:off x="504000" y="1888920"/>
-            <a:ext cx="11087640" cy="5022720"/>
+            <a:ext cx="11087280" cy="5022360"/>
           </a:xfrm>
           <a:prstGeom prst="rect">
             <a:avLst/>
@@ -5728,7 +5768,7 @@
             <a:normAutofit/>
           </a:bodyPr>
           <a:p>
-            <a:pPr marL="432000" indent="-323280">
+            <a:pPr marL="432000" indent="-322920">
               <a:lnSpc>
                 <a:spcPct val="100000"/>
               </a:lnSpc>
@@ -5750,7 +5790,47 @@
                 <a:latin typeface="Source Sans Pro"/>
                 <a:ea typeface="DejaVu Sans"/>
               </a:rPr>
-              <a:t>Написать модульные тесты для бизнес-логики</a:t>
+              <a:t>Сделать себе Fork репозитория </a:t>
+            </a:r>
+            <a:r>
+              <a:rPr b="0" lang="ru-RU" sz="3200" spc="-1" strike="noStrike">
+                <a:solidFill>
+                  <a:srgbClr val="000000"/>
+                </a:solidFill>
+                <a:latin typeface="Source Sans Pro"/>
+                <a:ea typeface="DejaVu Sans"/>
+                <a:hlinkClick r:id="rId1"/>
+              </a:rPr>
+              <a:t>https://github.com/PeshekhonovK/DeveloperInstrumentalTools</a:t>
+            </a:r>
+            <a:endParaRPr b="0" lang="ru-RU" sz="3200" spc="-1" strike="noStrike">
+              <a:latin typeface="Arial"/>
+            </a:endParaRPr>
+          </a:p>
+          <a:p>
+            <a:pPr marL="432000" indent="-322920">
+              <a:lnSpc>
+                <a:spcPct val="100000"/>
+              </a:lnSpc>
+              <a:spcAft>
+                <a:spcPts val="1409"/>
+              </a:spcAft>
+              <a:buClr>
+                <a:srgbClr val="04617b"/>
+              </a:buClr>
+              <a:buSzPct val="45000"/>
+              <a:buFont typeface="Wingdings" charset="2"/>
+              <a:buChar char=""/>
+            </a:pPr>
+            <a:r>
+              <a:rPr b="0" lang="ru-RU" sz="3200" spc="-1" strike="noStrike">
+                <a:solidFill>
+                  <a:srgbClr val="000000"/>
+                </a:solidFill>
+                <a:latin typeface="Source Sans Pro"/>
+                <a:ea typeface="DejaVu Sans"/>
+              </a:rPr>
+              <a:t>Для проекта Examples/Testing/UnitTestsTarget написать набор модульных тестов</a:t>
             </a:r>
             <a:endParaRPr b="0" lang="ru-RU" sz="3200" spc="-1" strike="noStrike">
               <a:latin typeface="Arial"/>
@@ -5760,33 +5840,14 @@
       </p:sp>
     </p:spTree>
   </p:cSld>
-  <p:timing>
-    <p:tnLst>
-      <p:par>
-        <p:cTn id="25" dur="indefinite" restart="never" nodeType="tmRoot">
-          <p:childTnLst>
-            <p:seq>
-              <p:cTn id="26" dur="indefinite" nodeType="mainSeq"/>
-              <p:prevCondLst>
-                <p:cond delay="0" evt="onPrev">
-                  <p:tgtEl>
-                    <p:sldTgt/>
-                  </p:tgtEl>
-                </p:cond>
-              </p:prevCondLst>
-              <p:nextCondLst>
-                <p:cond delay="0" evt="onNext">
-                  <p:tgtEl>
-                    <p:sldTgt/>
-                  </p:tgtEl>
-                </p:cond>
-              </p:nextCondLst>
-            </p:seq>
-          </p:childTnLst>
-        </p:cTn>
-      </p:par>
-    </p:tnLst>
-  </p:timing>
+  <mc:AlternateContent>
+    <mc:Choice Requires="p14">
+      <p:transition spd="slow" p14:dur="2000"/>
+    </mc:Choice>
+    <mc:Fallback>
+      <p:transition spd="slow"/>
+    </mc:Fallback>
+  </mc:AlternateContent>
 </p:sld>
 </file>
 
@@ -5816,7 +5877,7 @@
         <p:spPr>
           <a:xfrm>
             <a:off x="599040" y="841320"/>
-            <a:ext cx="10797840" cy="5851080"/>
+            <a:ext cx="10797480" cy="5850720"/>
           </a:xfrm>
           <a:prstGeom prst="rect">
             <a:avLst/>
@@ -5833,7 +5894,9 @@
           <a:fontRef idx="minor"/>
         </p:style>
         <p:txBody>
-          <a:bodyPr lIns="0" rIns="0" tIns="0" bIns="0" anchor="ctr"/>
+          <a:bodyPr lIns="0" rIns="0" tIns="0" bIns="0" anchor="ctr">
+            <a:noAutofit/>
+          </a:bodyPr>
           <a:p>
             <a:pPr algn="ctr">
               <a:lnSpc>
@@ -5858,33 +5921,14 @@
       </p:sp>
     </p:spTree>
   </p:cSld>
-  <p:timing>
-    <p:tnLst>
-      <p:par>
-        <p:cTn id="27" dur="indefinite" restart="never" nodeType="tmRoot">
-          <p:childTnLst>
-            <p:seq>
-              <p:cTn id="28" dur="indefinite" nodeType="mainSeq"/>
-              <p:prevCondLst>
-                <p:cond delay="0" evt="onPrev">
-                  <p:tgtEl>
-                    <p:sldTgt/>
-                  </p:tgtEl>
-                </p:cond>
-              </p:prevCondLst>
-              <p:nextCondLst>
-                <p:cond delay="0" evt="onNext">
-                  <p:tgtEl>
-                    <p:sldTgt/>
-                  </p:tgtEl>
-                </p:cond>
-              </p:nextCondLst>
-            </p:seq>
-          </p:childTnLst>
-        </p:cTn>
-      </p:par>
-    </p:tnLst>
-  </p:timing>
+  <mc:AlternateContent>
+    <mc:Choice Requires="p14">
+      <p:transition spd="slow" p14:dur="2000"/>
+    </mc:Choice>
+    <mc:Fallback>
+      <p:transition spd="slow"/>
+    </mc:Fallback>
+  </mc:AlternateContent>
 </p:sld>
 </file>
 
@@ -5914,7 +5958,7 @@
         <p:spPr>
           <a:xfrm>
             <a:off x="599040" y="121320"/>
-            <a:ext cx="10797840" cy="1261440"/>
+            <a:ext cx="10797480" cy="1261080"/>
           </a:xfrm>
           <a:prstGeom prst="rect">
             <a:avLst/>
@@ -5932,9 +5976,14 @@
         </p:style>
         <p:txBody>
           <a:bodyPr lIns="0" rIns="0" tIns="0" bIns="0" anchor="b">
-            <a:normAutofit/>
-          </a:bodyPr>
-          <a:p>
+            <a:normAutofit fontScale="28000"/>
+          </a:bodyPr>
+          <a:p>
+            <a:pPr>
+              <a:lnSpc>
+                <a:spcPct val="100000"/>
+              </a:lnSpc>
+            </a:pPr>
             <a:r>
               <a:rPr b="0" lang="ru-RU" sz="6000" spc="-1" strike="noStrike">
                 <a:solidFill>
@@ -5950,6 +5999,11 @@
             </a:endParaRPr>
           </a:p>
           <a:p>
+            <a:pPr>
+              <a:lnSpc>
+                <a:spcPct val="100000"/>
+              </a:lnSpc>
+            </a:pPr>
             <a:r>
               <a:rPr b="0" lang="ru-RU" sz="6000" spc="-1" strike="noStrike">
                 <a:solidFill>
@@ -5975,7 +6029,7 @@
         <p:spPr>
           <a:xfrm>
             <a:off x="599040" y="1920240"/>
-            <a:ext cx="10738800" cy="4662720"/>
+            <a:ext cx="10738440" cy="4662360"/>
           </a:xfrm>
           <a:prstGeom prst="rect">
             <a:avLst/>
@@ -5996,7 +6050,7 @@
             <a:normAutofit/>
           </a:bodyPr>
           <a:p>
-            <a:pPr marL="432000" indent="-323280">
+            <a:pPr marL="432000" indent="-322920">
               <a:lnSpc>
                 <a:spcPct val="100000"/>
               </a:lnSpc>
@@ -6025,7 +6079,7 @@
             </a:endParaRPr>
           </a:p>
           <a:p>
-            <a:pPr marL="432000" indent="-323280">
+            <a:pPr marL="432000" indent="-322920">
               <a:lnSpc>
                 <a:spcPct val="100000"/>
               </a:lnSpc>
@@ -6054,7 +6108,7 @@
             </a:endParaRPr>
           </a:p>
           <a:p>
-            <a:pPr marL="432000" indent="-323280">
+            <a:pPr marL="432000" indent="-322920">
               <a:lnSpc>
                 <a:spcPct val="100000"/>
               </a:lnSpc>
@@ -6083,7 +6137,7 @@
             </a:endParaRPr>
           </a:p>
           <a:p>
-            <a:pPr marL="432000" indent="-323280">
+            <a:pPr marL="432000" indent="-322920">
               <a:lnSpc>
                 <a:spcPct val="100000"/>
               </a:lnSpc>
@@ -6115,33 +6169,14 @@
       </p:sp>
     </p:spTree>
   </p:cSld>
-  <p:timing>
-    <p:tnLst>
-      <p:par>
-        <p:cTn id="3" dur="indefinite" restart="never" nodeType="tmRoot">
-          <p:childTnLst>
-            <p:seq>
-              <p:cTn id="4" dur="indefinite" nodeType="mainSeq"/>
-              <p:prevCondLst>
-                <p:cond delay="0" evt="onPrev">
-                  <p:tgtEl>
-                    <p:sldTgt/>
-                  </p:tgtEl>
-                </p:cond>
-              </p:prevCondLst>
-              <p:nextCondLst>
-                <p:cond delay="0" evt="onNext">
-                  <p:tgtEl>
-                    <p:sldTgt/>
-                  </p:tgtEl>
-                </p:cond>
-              </p:nextCondLst>
-            </p:seq>
-          </p:childTnLst>
-        </p:cTn>
-      </p:par>
-    </p:tnLst>
-  </p:timing>
+  <mc:AlternateContent>
+    <mc:Choice Requires="p14">
+      <p:transition spd="slow" p14:dur="2000"/>
+    </mc:Choice>
+    <mc:Fallback>
+      <p:transition spd="slow"/>
+    </mc:Fallback>
+  </mc:AlternateContent>
 </p:sld>
 </file>
 
@@ -6171,7 +6206,7 @@
         <p:spPr>
           <a:xfrm>
             <a:off x="599040" y="121320"/>
-            <a:ext cx="10797840" cy="1261440"/>
+            <a:ext cx="10797480" cy="1261080"/>
           </a:xfrm>
           <a:prstGeom prst="rect">
             <a:avLst/>
@@ -6189,14 +6224,24 @@
         </p:style>
         <p:txBody>
           <a:bodyPr lIns="0" rIns="0" tIns="0" bIns="0" anchor="b">
-            <a:normAutofit/>
-          </a:bodyPr>
-          <a:p>
+            <a:normAutofit fontScale="43000"/>
+          </a:bodyPr>
+          <a:p>
+            <a:pPr>
+              <a:lnSpc>
+                <a:spcPct val="100000"/>
+              </a:lnSpc>
+            </a:pPr>
             <a:endParaRPr b="0" lang="ru-RU" sz="1800" spc="-1" strike="noStrike">
               <a:latin typeface="Arial"/>
             </a:endParaRPr>
           </a:p>
           <a:p>
+            <a:pPr>
+              <a:lnSpc>
+                <a:spcPct val="100000"/>
+              </a:lnSpc>
+            </a:pPr>
             <a:r>
               <a:rPr b="0" lang="ru-RU" sz="6000" spc="-1" strike="noStrike">
                 <a:solidFill>
@@ -6222,7 +6267,7 @@
         <p:spPr>
           <a:xfrm>
             <a:off x="6264000" y="6552000"/>
-            <a:ext cx="5687640" cy="601920"/>
+            <a:ext cx="5687280" cy="601560"/>
           </a:xfrm>
           <a:prstGeom prst="rect">
             <a:avLst/>
@@ -6239,11 +6284,22 @@
           <a:fontRef idx="minor"/>
         </p:style>
         <p:txBody>
-          <a:bodyPr lIns="90000" rIns="90000" tIns="45000" bIns="45000"/>
-          <a:p>
+          <a:bodyPr lIns="90000" rIns="90000" tIns="45000" bIns="45000">
+            <a:noAutofit/>
+          </a:bodyPr>
+          <a:p>
+            <a:pPr>
+              <a:lnSpc>
+                <a:spcPct val="100000"/>
+              </a:lnSpc>
+            </a:pPr>
             <a:r>
               <a:rPr b="0" lang="ru-RU" sz="1800" spc="-1" strike="noStrike">
+                <a:solidFill>
+                  <a:srgbClr val="000000"/>
+                </a:solidFill>
                 <a:latin typeface="Arial"/>
+                <a:ea typeface="DejaVu Sans"/>
               </a:rPr>
               <a:t>https://gkedge.gitbooks.io/javascript-acceptance-testing/content/Testing_Pyramid.jpg</a:t>
             </a:r>
@@ -6266,7 +6322,7 @@
         <p:spPr>
           <a:xfrm>
             <a:off x="5348880" y="1656000"/>
-            <a:ext cx="6649200" cy="4967640"/>
+            <a:ext cx="6648840" cy="4967280"/>
           </a:xfrm>
           <a:prstGeom prst="rect">
             <a:avLst/>
@@ -6289,7 +6345,7 @@
         <p:spPr>
           <a:xfrm>
             <a:off x="216000" y="2088000"/>
-            <a:ext cx="5714280" cy="4237920"/>
+            <a:ext cx="5713920" cy="4237560"/>
           </a:xfrm>
           <a:prstGeom prst="rect">
             <a:avLst/>
@@ -6308,7 +6364,7 @@
         <p:spPr>
           <a:xfrm>
             <a:off x="504000" y="6552000"/>
-            <a:ext cx="5570640" cy="346320"/>
+            <a:ext cx="5570280" cy="345960"/>
           </a:xfrm>
           <a:prstGeom prst="rect">
             <a:avLst/>
@@ -6325,11 +6381,22 @@
           <a:fontRef idx="minor"/>
         </p:style>
         <p:txBody>
-          <a:bodyPr lIns="90000" rIns="90000" tIns="45000" bIns="45000"/>
-          <a:p>
+          <a:bodyPr lIns="90000" rIns="90000" tIns="45000" bIns="45000">
+            <a:noAutofit/>
+          </a:bodyPr>
+          <a:p>
+            <a:pPr>
+              <a:lnSpc>
+                <a:spcPct val="100000"/>
+              </a:lnSpc>
+            </a:pPr>
             <a:r>
               <a:rPr b="0" lang="ru-RU" sz="1800" spc="-1" strike="noStrike">
+                <a:solidFill>
+                  <a:srgbClr val="000000"/>
+                </a:solidFill>
                 <a:latin typeface="Arial"/>
+                <a:ea typeface="DejaVu Sans"/>
               </a:rPr>
               <a:t>http://hackingig.com/what-are-software-testing-levels/</a:t>
             </a:r>
@@ -6341,33 +6408,14 @@
       </p:sp>
     </p:spTree>
   </p:cSld>
-  <p:timing>
-    <p:tnLst>
-      <p:par>
-        <p:cTn id="5" dur="indefinite" restart="never" nodeType="tmRoot">
-          <p:childTnLst>
-            <p:seq>
-              <p:cTn id="6" dur="indefinite" nodeType="mainSeq"/>
-              <p:prevCondLst>
-                <p:cond delay="0" evt="onPrev">
-                  <p:tgtEl>
-                    <p:sldTgt/>
-                  </p:tgtEl>
-                </p:cond>
-              </p:prevCondLst>
-              <p:nextCondLst>
-                <p:cond delay="0" evt="onNext">
-                  <p:tgtEl>
-                    <p:sldTgt/>
-                  </p:tgtEl>
-                </p:cond>
-              </p:nextCondLst>
-            </p:seq>
-          </p:childTnLst>
-        </p:cTn>
-      </p:par>
-    </p:tnLst>
-  </p:timing>
+  <mc:AlternateContent>
+    <mc:Choice Requires="p14">
+      <p:transition spd="slow" p14:dur="2000"/>
+    </mc:Choice>
+    <mc:Fallback>
+      <p:transition spd="slow"/>
+    </mc:Fallback>
+  </mc:AlternateContent>
 </p:sld>
 </file>
 
@@ -6397,7 +6445,7 @@
         <p:spPr>
           <a:xfrm>
             <a:off x="599040" y="121320"/>
-            <a:ext cx="10797840" cy="1261440"/>
+            <a:ext cx="10797480" cy="1261080"/>
           </a:xfrm>
           <a:prstGeom prst="rect">
             <a:avLst/>
@@ -6418,6 +6466,11 @@
             <a:normAutofit/>
           </a:bodyPr>
           <a:p>
+            <a:pPr>
+              <a:lnSpc>
+                <a:spcPct val="100000"/>
+              </a:lnSpc>
+            </a:pPr>
             <a:r>
               <a:rPr b="0" lang="ru-RU" sz="6000" spc="-1" strike="noStrike">
                 <a:solidFill>
@@ -6443,7 +6496,7 @@
         <p:spPr>
           <a:xfrm>
             <a:off x="599040" y="1920240"/>
-            <a:ext cx="10738800" cy="4662720"/>
+            <a:ext cx="10738440" cy="4662360"/>
           </a:xfrm>
           <a:prstGeom prst="rect">
             <a:avLst/>
@@ -6461,10 +6514,10 @@
         </p:style>
         <p:txBody>
           <a:bodyPr lIns="0" rIns="0" tIns="0" bIns="0">
-            <a:normAutofit/>
-          </a:bodyPr>
-          <a:p>
-            <a:pPr marL="432000" indent="-323280">
+            <a:normAutofit fontScale="70000"/>
+          </a:bodyPr>
+          <a:p>
+            <a:pPr marL="432000" indent="-322920">
               <a:lnSpc>
                 <a:spcPct val="100000"/>
               </a:lnSpc>
@@ -6493,7 +6546,7 @@
             </a:endParaRPr>
           </a:p>
           <a:p>
-            <a:pPr marL="432000" indent="-323280">
+            <a:pPr marL="432000" indent="-322920">
               <a:lnSpc>
                 <a:spcPct val="100000"/>
               </a:lnSpc>
@@ -6522,7 +6575,7 @@
             </a:endParaRPr>
           </a:p>
           <a:p>
-            <a:pPr marL="432000" indent="-323280">
+            <a:pPr marL="432000" indent="-322920">
               <a:lnSpc>
                 <a:spcPct val="100000"/>
               </a:lnSpc>
@@ -6551,7 +6604,7 @@
             </a:endParaRPr>
           </a:p>
           <a:p>
-            <a:pPr marL="432000" indent="-323280">
+            <a:pPr marL="432000" indent="-322920">
               <a:lnSpc>
                 <a:spcPct val="100000"/>
               </a:lnSpc>
@@ -6580,7 +6633,7 @@
             </a:endParaRPr>
           </a:p>
           <a:p>
-            <a:pPr marL="432000" indent="-323280">
+            <a:pPr marL="432000" indent="-322920">
               <a:lnSpc>
                 <a:spcPct val="100000"/>
               </a:lnSpc>
@@ -6602,7 +6655,7 @@
                 <a:latin typeface="Source Sans Pro"/>
                 <a:ea typeface="DejaVu Sans"/>
               </a:rPr>
-              <a:t>Moq</a:t>
+              <a:t>Moq, FluentAssertions</a:t>
             </a:r>
             <a:endParaRPr b="0" lang="ru-RU" sz="3200" spc="-1" strike="noStrike">
               <a:latin typeface="Arial"/>
@@ -6612,33 +6665,14 @@
       </p:sp>
     </p:spTree>
   </p:cSld>
-  <p:timing>
-    <p:tnLst>
-      <p:par>
-        <p:cTn id="7" dur="indefinite" restart="never" nodeType="tmRoot">
-          <p:childTnLst>
-            <p:seq>
-              <p:cTn id="8" dur="indefinite" nodeType="mainSeq"/>
-              <p:prevCondLst>
-                <p:cond delay="0" evt="onPrev">
-                  <p:tgtEl>
-                    <p:sldTgt/>
-                  </p:tgtEl>
-                </p:cond>
-              </p:prevCondLst>
-              <p:nextCondLst>
-                <p:cond delay="0" evt="onNext">
-                  <p:tgtEl>
-                    <p:sldTgt/>
-                  </p:tgtEl>
-                </p:cond>
-              </p:nextCondLst>
-            </p:seq>
-          </p:childTnLst>
-        </p:cTn>
-      </p:par>
-    </p:tnLst>
-  </p:timing>
+  <mc:AlternateContent>
+    <mc:Choice Requires="p14">
+      <p:transition spd="slow" p14:dur="2000"/>
+    </mc:Choice>
+    <mc:Fallback>
+      <p:transition spd="slow"/>
+    </mc:Fallback>
+  </mc:AlternateContent>
 </p:sld>
 </file>
 
@@ -6668,7 +6702,7 @@
         <p:spPr>
           <a:xfrm>
             <a:off x="599040" y="121320"/>
-            <a:ext cx="10797840" cy="1261440"/>
+            <a:ext cx="10797480" cy="1261080"/>
           </a:xfrm>
           <a:prstGeom prst="rect">
             <a:avLst/>
@@ -6689,6 +6723,11 @@
             <a:normAutofit/>
           </a:bodyPr>
           <a:p>
+            <a:pPr>
+              <a:lnSpc>
+                <a:spcPct val="100000"/>
+              </a:lnSpc>
+            </a:pPr>
             <a:r>
               <a:rPr b="0" lang="ru-RU" sz="6000" spc="-1" strike="noStrike">
                 <a:solidFill>
@@ -6714,7 +6753,7 @@
         <p:spPr>
           <a:xfrm>
             <a:off x="599040" y="1920240"/>
-            <a:ext cx="10738800" cy="4662720"/>
+            <a:ext cx="10738440" cy="4662360"/>
           </a:xfrm>
           <a:prstGeom prst="rect">
             <a:avLst/>
@@ -6732,10 +6771,10 @@
         </p:style>
         <p:txBody>
           <a:bodyPr lIns="0" rIns="0" tIns="0" bIns="0">
-            <a:normAutofit/>
-          </a:bodyPr>
-          <a:p>
-            <a:pPr marL="432000" indent="-323280">
+            <a:normAutofit fontScale="94000"/>
+          </a:bodyPr>
+          <a:p>
+            <a:pPr marL="432000" indent="-322920">
               <a:lnSpc>
                 <a:spcPct val="100000"/>
               </a:lnSpc>
@@ -6764,7 +6803,7 @@
             </a:endParaRPr>
           </a:p>
           <a:p>
-            <a:pPr marL="432000" indent="-323280">
+            <a:pPr marL="432000" indent="-322920">
               <a:lnSpc>
                 <a:spcPct val="100000"/>
               </a:lnSpc>
@@ -6793,7 +6832,7 @@
             </a:endParaRPr>
           </a:p>
           <a:p>
-            <a:pPr marL="432000" indent="-323280">
+            <a:pPr marL="432000" indent="-322920">
               <a:lnSpc>
                 <a:spcPct val="100000"/>
               </a:lnSpc>
@@ -6815,14 +6854,14 @@
                 <a:latin typeface="Source Sans Pro"/>
                 <a:ea typeface="DejaVu Sans"/>
               </a:rPr>
-              <a:t>Тестирование методов черного ящика</a:t>
-            </a:r>
-            <a:endParaRPr b="0" lang="ru-RU" sz="3200" spc="-1" strike="noStrike">
-              <a:latin typeface="Arial"/>
-            </a:endParaRPr>
-          </a:p>
-          <a:p>
-            <a:pPr marL="432000" indent="-323280">
+              <a:t>Тестирование методов черного (максимум - серого) ящика</a:t>
+            </a:r>
+            <a:endParaRPr b="0" lang="ru-RU" sz="3200" spc="-1" strike="noStrike">
+              <a:latin typeface="Arial"/>
+            </a:endParaRPr>
+          </a:p>
+          <a:p>
+            <a:pPr marL="432000" indent="-322920">
               <a:lnSpc>
                 <a:spcPct val="100000"/>
               </a:lnSpc>
@@ -6844,8 +6883,27 @@
                 <a:latin typeface="Source Sans Pro"/>
                 <a:ea typeface="DejaVu Sans"/>
               </a:rPr>
-              <a:t> </a:t>
-            </a:r>
+              <a:t>Запуск перед отправкой задачи на тестирование, плюс на сервере сборки по таймеру/триггеру</a:t>
+            </a:r>
+            <a:endParaRPr b="0" lang="ru-RU" sz="3200" spc="-1" strike="noStrike">
+              <a:latin typeface="Arial"/>
+            </a:endParaRPr>
+          </a:p>
+          <a:p>
+            <a:pPr marL="432000" indent="-322920">
+              <a:lnSpc>
+                <a:spcPct val="100000"/>
+              </a:lnSpc>
+              <a:spcAft>
+                <a:spcPts val="1409"/>
+              </a:spcAft>
+              <a:buClr>
+                <a:srgbClr val="04617b"/>
+              </a:buClr>
+              <a:buSzPct val="45000"/>
+              <a:buFont typeface="Wingdings" charset="2"/>
+              <a:buChar char=""/>
+            </a:pPr>
             <a:r>
               <a:rPr b="0" lang="ru-RU" sz="3200" spc="-1" strike="noStrike">
                 <a:solidFill>
@@ -6854,7 +6912,7 @@
                 <a:latin typeface="Source Sans Pro"/>
                 <a:ea typeface="DejaVu Sans"/>
               </a:rPr>
-              <a:t>Запуск перед отправкой задачи на тестирование, плюс на сервере сборки</a:t>
+              <a:t>Зеленые интеграционные тесты — необходимое (но не достаточное) условие отдачи очередного пакета</a:t>
             </a:r>
             <a:endParaRPr b="0" lang="ru-RU" sz="3200" spc="-1" strike="noStrike">
               <a:latin typeface="Arial"/>
@@ -6864,33 +6922,14 @@
       </p:sp>
     </p:spTree>
   </p:cSld>
-  <p:timing>
-    <p:tnLst>
-      <p:par>
-        <p:cTn id="9" dur="indefinite" restart="never" nodeType="tmRoot">
-          <p:childTnLst>
-            <p:seq>
-              <p:cTn id="10" dur="indefinite" nodeType="mainSeq"/>
-              <p:prevCondLst>
-                <p:cond delay="0" evt="onPrev">
-                  <p:tgtEl>
-                    <p:sldTgt/>
-                  </p:tgtEl>
-                </p:cond>
-              </p:prevCondLst>
-              <p:nextCondLst>
-                <p:cond delay="0" evt="onNext">
-                  <p:tgtEl>
-                    <p:sldTgt/>
-                  </p:tgtEl>
-                </p:cond>
-              </p:nextCondLst>
-            </p:seq>
-          </p:childTnLst>
-        </p:cTn>
-      </p:par>
-    </p:tnLst>
-  </p:timing>
+  <mc:AlternateContent>
+    <mc:Choice Requires="p14">
+      <p:transition spd="slow" p14:dur="2000"/>
+    </mc:Choice>
+    <mc:Fallback>
+      <p:transition spd="slow"/>
+    </mc:Fallback>
+  </mc:AlternateContent>
 </p:sld>
 </file>
 
@@ -6920,7 +6959,7 @@
         <p:spPr>
           <a:xfrm>
             <a:off x="599040" y="121320"/>
-            <a:ext cx="10797840" cy="1261440"/>
+            <a:ext cx="10797480" cy="1261080"/>
           </a:xfrm>
           <a:prstGeom prst="rect">
             <a:avLst/>
@@ -6938,9 +6977,14 @@
         </p:style>
         <p:txBody>
           <a:bodyPr lIns="0" rIns="0" tIns="0" bIns="0" anchor="b">
-            <a:normAutofit/>
-          </a:bodyPr>
-          <a:p>
+            <a:normAutofit fontScale="52000"/>
+          </a:bodyPr>
+          <a:p>
+            <a:pPr>
+              <a:lnSpc>
+                <a:spcPct val="100000"/>
+              </a:lnSpc>
+            </a:pPr>
             <a:r>
               <a:rPr b="0" lang="ru-RU" sz="6000" spc="-1" strike="noStrike">
                 <a:solidFill>
@@ -6966,7 +7010,7 @@
         <p:spPr>
           <a:xfrm>
             <a:off x="599040" y="1920240"/>
-            <a:ext cx="10738800" cy="4662720"/>
+            <a:ext cx="10738440" cy="4662360"/>
           </a:xfrm>
           <a:prstGeom prst="rect">
             <a:avLst/>
@@ -6984,10 +7028,10 @@
         </p:style>
         <p:txBody>
           <a:bodyPr lIns="0" rIns="0" tIns="0" bIns="0">
-            <a:normAutofit/>
-          </a:bodyPr>
-          <a:p>
-            <a:pPr marL="432000" indent="-323280">
+            <a:normAutofit fontScale="34000"/>
+          </a:bodyPr>
+          <a:p>
+            <a:pPr marL="432000" indent="-322920">
               <a:lnSpc>
                 <a:spcPct val="100000"/>
               </a:lnSpc>
@@ -7016,7 +7060,7 @@
             </a:endParaRPr>
           </a:p>
           <a:p>
-            <a:pPr marL="432000" indent="-323280">
+            <a:pPr marL="432000" indent="-322920">
               <a:lnSpc>
                 <a:spcPct val="100000"/>
               </a:lnSpc>
@@ -7045,7 +7089,7 @@
             </a:endParaRPr>
           </a:p>
           <a:p>
-            <a:pPr marL="432000" indent="-323280">
+            <a:pPr marL="432000" indent="-322920">
               <a:lnSpc>
                 <a:spcPct val="100000"/>
               </a:lnSpc>
@@ -7330,33 +7374,14 @@
       </p:sp>
     </p:spTree>
   </p:cSld>
-  <p:timing>
-    <p:tnLst>
-      <p:par>
-        <p:cTn id="11" dur="indefinite" restart="never" nodeType="tmRoot">
-          <p:childTnLst>
-            <p:seq>
-              <p:cTn id="12" dur="indefinite" nodeType="mainSeq"/>
-              <p:prevCondLst>
-                <p:cond delay="0" evt="onPrev">
-                  <p:tgtEl>
-                    <p:sldTgt/>
-                  </p:tgtEl>
-                </p:cond>
-              </p:prevCondLst>
-              <p:nextCondLst>
-                <p:cond delay="0" evt="onNext">
-                  <p:tgtEl>
-                    <p:sldTgt/>
-                  </p:tgtEl>
-                </p:cond>
-              </p:nextCondLst>
-            </p:seq>
-          </p:childTnLst>
-        </p:cTn>
-      </p:par>
-    </p:tnLst>
-  </p:timing>
+  <mc:AlternateContent>
+    <mc:Choice Requires="p14">
+      <p:transition spd="slow" p14:dur="2000"/>
+    </mc:Choice>
+    <mc:Fallback>
+      <p:transition spd="slow"/>
+    </mc:Fallback>
+  </mc:AlternateContent>
 </p:sld>
 </file>
 
@@ -7386,7 +7411,7 @@
         <p:spPr>
           <a:xfrm>
             <a:off x="599040" y="121320"/>
-            <a:ext cx="10797840" cy="1261440"/>
+            <a:ext cx="10797480" cy="1261080"/>
           </a:xfrm>
           <a:prstGeom prst="rect">
             <a:avLst/>
@@ -7407,6 +7432,11 @@
             <a:normAutofit/>
           </a:bodyPr>
           <a:p>
+            <a:pPr>
+              <a:lnSpc>
+                <a:spcPct val="100000"/>
+              </a:lnSpc>
+            </a:pPr>
             <a:r>
               <a:rPr b="0" lang="ru-RU" sz="6000" spc="-1" strike="noStrike">
                 <a:solidFill>
@@ -7432,7 +7462,7 @@
         <p:spPr>
           <a:xfrm>
             <a:off x="599040" y="1920240"/>
-            <a:ext cx="10738800" cy="4662720"/>
+            <a:ext cx="10738440" cy="4662360"/>
           </a:xfrm>
           <a:prstGeom prst="rect">
             <a:avLst/>
@@ -7453,7 +7483,7 @@
             <a:normAutofit/>
           </a:bodyPr>
           <a:p>
-            <a:pPr marL="432000" indent="-323280">
+            <a:pPr marL="432000" indent="-322920">
               <a:lnSpc>
                 <a:spcPct val="100000"/>
               </a:lnSpc>
@@ -7482,7 +7512,7 @@
             </a:endParaRPr>
           </a:p>
           <a:p>
-            <a:pPr marL="432000" indent="-323280">
+            <a:pPr marL="432000" indent="-322920">
               <a:lnSpc>
                 <a:spcPct val="100000"/>
               </a:lnSpc>
@@ -7511,7 +7541,7 @@
             </a:endParaRPr>
           </a:p>
           <a:p>
-            <a:pPr marL="432000" indent="-323280">
+            <a:pPr marL="432000" indent="-322920">
               <a:lnSpc>
                 <a:spcPct val="100000"/>
               </a:lnSpc>
@@ -7543,33 +7573,14 @@
       </p:sp>
     </p:spTree>
   </p:cSld>
-  <p:timing>
-    <p:tnLst>
-      <p:par>
-        <p:cTn id="13" dur="indefinite" restart="never" nodeType="tmRoot">
-          <p:childTnLst>
-            <p:seq>
-              <p:cTn id="14" dur="indefinite" nodeType="mainSeq"/>
-              <p:prevCondLst>
-                <p:cond delay="0" evt="onPrev">
-                  <p:tgtEl>
-                    <p:sldTgt/>
-                  </p:tgtEl>
-                </p:cond>
-              </p:prevCondLst>
-              <p:nextCondLst>
-                <p:cond delay="0" evt="onNext">
-                  <p:tgtEl>
-                    <p:sldTgt/>
-                  </p:tgtEl>
-                </p:cond>
-              </p:nextCondLst>
-            </p:seq>
-          </p:childTnLst>
-        </p:cTn>
-      </p:par>
-    </p:tnLst>
-  </p:timing>
+  <mc:AlternateContent>
+    <mc:Choice Requires="p14">
+      <p:transition spd="slow" p14:dur="2000"/>
+    </mc:Choice>
+    <mc:Fallback>
+      <p:transition spd="slow"/>
+    </mc:Fallback>
+  </mc:AlternateContent>
 </p:sld>
 </file>
 
@@ -7599,7 +7610,7 @@
         <p:spPr>
           <a:xfrm>
             <a:off x="599040" y="121320"/>
-            <a:ext cx="10797840" cy="1261440"/>
+            <a:ext cx="10797480" cy="1261080"/>
           </a:xfrm>
           <a:prstGeom prst="rect">
             <a:avLst/>
@@ -7620,6 +7631,11 @@
             <a:normAutofit/>
           </a:bodyPr>
           <a:p>
+            <a:pPr>
+              <a:lnSpc>
+                <a:spcPct val="100000"/>
+              </a:lnSpc>
+            </a:pPr>
             <a:r>
               <a:rPr b="0" lang="ru-RU" sz="6000" spc="-1" strike="noStrike">
                 <a:solidFill>
@@ -7645,7 +7661,7 @@
         <p:spPr>
           <a:xfrm>
             <a:off x="504000" y="1888920"/>
-            <a:ext cx="10738800" cy="4662720"/>
+            <a:ext cx="10738440" cy="4662360"/>
           </a:xfrm>
           <a:prstGeom prst="rect">
             <a:avLst/>
@@ -7666,7 +7682,7 @@
             <a:normAutofit/>
           </a:bodyPr>
           <a:p>
-            <a:pPr marL="432000" indent="-323280">
+            <a:pPr marL="432000" indent="-322920">
               <a:lnSpc>
                 <a:spcPct val="100000"/>
               </a:lnSpc>
@@ -7695,7 +7711,7 @@
             </a:endParaRPr>
           </a:p>
           <a:p>
-            <a:pPr marL="432000" indent="-323280">
+            <a:pPr marL="432000" indent="-322920">
               <a:lnSpc>
                 <a:spcPct val="100000"/>
               </a:lnSpc>
@@ -7724,7 +7740,7 @@
             </a:endParaRPr>
           </a:p>
           <a:p>
-            <a:pPr marL="432000" indent="-323280">
+            <a:pPr marL="432000" indent="-322920">
               <a:lnSpc>
                 <a:spcPct val="100000"/>
               </a:lnSpc>
@@ -7753,7 +7769,7 @@
             </a:endParaRPr>
           </a:p>
           <a:p>
-            <a:pPr marL="432000" indent="-323280">
+            <a:pPr marL="432000" indent="-322920">
               <a:lnSpc>
                 <a:spcPct val="100000"/>
               </a:lnSpc>
@@ -7775,6 +7791,35 @@
                 <a:latin typeface="Source Sans Pro"/>
                 <a:ea typeface="DejaVu Sans"/>
               </a:rPr>
+              <a:t>Интегрирован в Rider</a:t>
+            </a:r>
+            <a:endParaRPr b="0" lang="ru-RU" sz="3200" spc="-1" strike="noStrike">
+              <a:latin typeface="Arial"/>
+            </a:endParaRPr>
+          </a:p>
+          <a:p>
+            <a:pPr marL="432000" indent="-322920">
+              <a:lnSpc>
+                <a:spcPct val="100000"/>
+              </a:lnSpc>
+              <a:spcAft>
+                <a:spcPts val="1409"/>
+              </a:spcAft>
+              <a:buClr>
+                <a:srgbClr val="04617b"/>
+              </a:buClr>
+              <a:buSzPct val="45000"/>
+              <a:buFont typeface="Wingdings" charset="2"/>
+              <a:buChar char=""/>
+            </a:pPr>
+            <a:r>
+              <a:rPr b="0" lang="ru-RU" sz="3200" spc="-1" strike="noStrike">
+                <a:solidFill>
+                  <a:srgbClr val="000000"/>
+                </a:solidFill>
+                <a:latin typeface="Source Sans Pro"/>
+                <a:ea typeface="DejaVu Sans"/>
+              </a:rPr>
               <a:t>Документация: https://github.com/nunit/docs/wiki</a:t>
             </a:r>
             <a:endParaRPr b="0" lang="ru-RU" sz="3200" spc="-1" strike="noStrike">
@@ -7785,33 +7830,14 @@
       </p:sp>
     </p:spTree>
   </p:cSld>
-  <p:timing>
-    <p:tnLst>
-      <p:par>
-        <p:cTn id="15" dur="indefinite" restart="never" nodeType="tmRoot">
-          <p:childTnLst>
-            <p:seq>
-              <p:cTn id="16" dur="indefinite" nodeType="mainSeq"/>
-              <p:prevCondLst>
-                <p:cond delay="0" evt="onPrev">
-                  <p:tgtEl>
-                    <p:sldTgt/>
-                  </p:tgtEl>
-                </p:cond>
-              </p:prevCondLst>
-              <p:nextCondLst>
-                <p:cond delay="0" evt="onNext">
-                  <p:tgtEl>
-                    <p:sldTgt/>
-                  </p:tgtEl>
-                </p:cond>
-              </p:nextCondLst>
-            </p:seq>
-          </p:childTnLst>
-        </p:cTn>
-      </p:par>
-    </p:tnLst>
-  </p:timing>
+  <mc:AlternateContent>
+    <mc:Choice Requires="p14">
+      <p:transition spd="slow" p14:dur="2000"/>
+    </mc:Choice>
+    <mc:Fallback>
+      <p:transition spd="slow"/>
+    </mc:Fallback>
+  </mc:AlternateContent>
 </p:sld>
 </file>
 
@@ -7841,7 +7867,7 @@
         <p:spPr>
           <a:xfrm>
             <a:off x="599040" y="121320"/>
-            <a:ext cx="10797840" cy="1261440"/>
+            <a:ext cx="10797480" cy="1261080"/>
           </a:xfrm>
           <a:prstGeom prst="rect">
             <a:avLst/>
@@ -7862,6 +7888,11 @@
             <a:normAutofit/>
           </a:bodyPr>
           <a:p>
+            <a:pPr>
+              <a:lnSpc>
+                <a:spcPct val="100000"/>
+              </a:lnSpc>
+            </a:pPr>
             <a:r>
               <a:rPr b="0" lang="ru-RU" sz="6000" spc="-1" strike="noStrike">
                 <a:solidFill>
@@ -7887,7 +7918,7 @@
         <p:spPr>
           <a:xfrm>
             <a:off x="504000" y="1888920"/>
-            <a:ext cx="10738800" cy="4662720"/>
+            <a:ext cx="10738440" cy="4662360"/>
           </a:xfrm>
           <a:prstGeom prst="rect">
             <a:avLst/>
@@ -7905,10 +7936,10 @@
         </p:style>
         <p:txBody>
           <a:bodyPr lIns="0" rIns="0" tIns="0" bIns="0">
-            <a:normAutofit/>
-          </a:bodyPr>
-          <a:p>
-            <a:pPr marL="432000" indent="-323280">
+            <a:normAutofit fontScale="84000"/>
+          </a:bodyPr>
+          <a:p>
+            <a:pPr marL="432000" indent="-322920">
               <a:lnSpc>
                 <a:spcPct val="100000"/>
               </a:lnSpc>
@@ -7937,7 +7968,7 @@
             </a:endParaRPr>
           </a:p>
           <a:p>
-            <a:pPr marL="432000" indent="-323280">
+            <a:pPr marL="432000" indent="-322920">
               <a:lnSpc>
                 <a:spcPct val="100000"/>
               </a:lnSpc>
@@ -7962,11 +7993,10 @@
               <a:t>OpenCover: </a:t>
             </a:r>
             <a:r>
-              <a:rPr b="0" lang="ru-RU" sz="3200" spc="-1" strike="noStrike" u="sng">
+              <a:rPr b="0" lang="ru-RU" sz="3200" spc="-1" strike="noStrike">
                 <a:solidFill>
-                  <a:srgbClr val="0000ff"/>
+                  <a:srgbClr val="000000"/>
                 </a:solidFill>
-                <a:uFillTx/>
                 <a:latin typeface="Source Sans Pro"/>
                 <a:ea typeface="DejaVu Sans"/>
                 <a:hlinkClick r:id="rId1"/>
@@ -7978,7 +8008,7 @@
             </a:endParaRPr>
           </a:p>
           <a:p>
-            <a:pPr marL="432000" indent="-323280">
+            <a:pPr marL="432000" indent="-322920">
               <a:lnSpc>
                 <a:spcPct val="100000"/>
               </a:lnSpc>
@@ -8003,11 +8033,10 @@
               <a:t>ReportGenerator </a:t>
             </a:r>
             <a:r>
-              <a:rPr b="0" lang="ru-RU" sz="3200" spc="-1" strike="noStrike" u="sng">
+              <a:rPr b="0" lang="ru-RU" sz="3200" spc="-1" strike="noStrike">
                 <a:solidFill>
-                  <a:srgbClr val="0000ff"/>
+                  <a:srgbClr val="000000"/>
                 </a:solidFill>
-                <a:uFillTx/>
                 <a:latin typeface="Source Sans Pro"/>
                 <a:ea typeface="DejaVu Sans"/>
                 <a:hlinkClick r:id="rId2"/>
@@ -8019,7 +8048,7 @@
             </a:endParaRPr>
           </a:p>
           <a:p>
-            <a:pPr marL="432000" indent="-323280">
+            <a:pPr marL="432000" indent="-322920">
               <a:lnSpc>
                 <a:spcPct val="100000"/>
               </a:lnSpc>
@@ -8041,20 +8070,90 @@
                 <a:latin typeface="Source Sans Pro"/>
                 <a:ea typeface="DejaVu Sans"/>
               </a:rPr>
-              <a:t>Для загрузки результатов в Azure DevOps: </a:t>
-            </a:r>
-            <a:r>
-              <a:rPr b="0" lang="ru-RU" sz="3200" spc="-1" strike="noStrike" u="sng">
+              <a:t>ReportGenerator существует как DotNet Global (Local) Tool</a:t>
+            </a:r>
+            <a:endParaRPr b="0" lang="ru-RU" sz="3200" spc="-1" strike="noStrike">
+              <a:latin typeface="Arial"/>
+            </a:endParaRPr>
+          </a:p>
+          <a:p>
+            <a:pPr marL="432000" indent="-322920">
+              <a:lnSpc>
+                <a:spcPct val="100000"/>
+              </a:lnSpc>
+              <a:spcAft>
+                <a:spcPts val="1409"/>
+              </a:spcAft>
+              <a:buClr>
+                <a:srgbClr val="04617b"/>
+              </a:buClr>
+              <a:buSzPct val="45000"/>
+              <a:buFont typeface="Wingdings" charset="2"/>
+              <a:buChar char=""/>
+            </a:pPr>
+            <a:r>
+              <a:rPr b="0" lang="ru-RU" sz="3200" spc="-1" strike="noStrike">
                 <a:solidFill>
-                  <a:srgbClr val="0000ff"/>
+                  <a:srgbClr val="000000"/>
                 </a:solidFill>
-                <a:uFillTx/>
+                <a:latin typeface="Source Sans Pro"/>
+                <a:ea typeface="DejaVu Sans"/>
+              </a:rPr>
+              <a:t>Coverlet: </a:t>
+            </a:r>
+            <a:r>
+              <a:rPr b="0" lang="ru-RU" sz="3200" spc="-1" strike="noStrike">
+                <a:solidFill>
+                  <a:srgbClr val="000000"/>
+                </a:solidFill>
                 <a:latin typeface="Source Sans Pro"/>
                 <a:ea typeface="DejaVu Sans"/>
                 <a:hlinkClick r:id="rId3"/>
               </a:rPr>
-              <a:t>https://github.com/danielpalme/OpenCoverToCoberturaConverter</a:t>
-            </a:r>
+              <a:t>https://github.com/coverlet-coverage/coverlet</a:t>
+            </a:r>
+            <a:endParaRPr b="0" lang="ru-RU" sz="3200" spc="-1" strike="noStrike">
+              <a:latin typeface="Arial"/>
+            </a:endParaRPr>
+          </a:p>
+          <a:p>
+            <a:pPr marL="432000" indent="-322920">
+              <a:lnSpc>
+                <a:spcPct val="100000"/>
+              </a:lnSpc>
+              <a:spcAft>
+                <a:spcPts val="1409"/>
+              </a:spcAft>
+              <a:buClr>
+                <a:srgbClr val="04617b"/>
+              </a:buClr>
+              <a:buSzPct val="45000"/>
+              <a:buFont typeface="Wingdings" charset="2"/>
+              <a:buChar char=""/>
+            </a:pPr>
+            <a:r>
+              <a:rPr b="0" lang="ru-RU" sz="3200" spc="-1" strike="noStrike">
+                <a:solidFill>
+                  <a:srgbClr val="000000"/>
+                </a:solidFill>
+                <a:latin typeface="Source Sans Pro"/>
+                <a:ea typeface="DejaVu Sans"/>
+              </a:rPr>
+              <a:t>Coverlet — NuGet package + параметр запуска dotnet test</a:t>
+            </a:r>
+            <a:endParaRPr b="0" lang="ru-RU" sz="3200" spc="-1" strike="noStrike">
+              <a:latin typeface="Arial"/>
+            </a:endParaRPr>
+          </a:p>
+          <a:p>
+            <a:pPr>
+              <a:lnSpc>
+                <a:spcPct val="100000"/>
+              </a:lnSpc>
+              <a:spcAft>
+                <a:spcPts val="1409"/>
+              </a:spcAft>
+            </a:pPr>
             <a:endParaRPr b="0" lang="ru-RU" sz="3200" spc="-1" strike="noStrike">
               <a:latin typeface="Arial"/>
             </a:endParaRPr>
@@ -8063,33 +8162,14 @@
       </p:sp>
     </p:spTree>
   </p:cSld>
-  <p:timing>
-    <p:tnLst>
-      <p:par>
-        <p:cTn id="17" dur="indefinite" restart="never" nodeType="tmRoot">
-          <p:childTnLst>
-            <p:seq>
-              <p:cTn id="18" dur="indefinite" nodeType="mainSeq"/>
-              <p:prevCondLst>
-                <p:cond delay="0" evt="onPrev">
-                  <p:tgtEl>
-                    <p:sldTgt/>
-                  </p:tgtEl>
-                </p:cond>
-              </p:prevCondLst>
-              <p:nextCondLst>
-                <p:cond delay="0" evt="onNext">
-                  <p:tgtEl>
-                    <p:sldTgt/>
-                  </p:tgtEl>
-                </p:cond>
-              </p:nextCondLst>
-            </p:seq>
-          </p:childTnLst>
-        </p:cTn>
-      </p:par>
-    </p:tnLst>
-  </p:timing>
+  <mc:AlternateContent>
+    <mc:Choice Requires="p14">
+      <p:transition spd="slow" p14:dur="2000"/>
+    </mc:Choice>
+    <mc:Fallback>
+      <p:transition spd="slow"/>
+    </mc:Fallback>
+  </mc:AlternateContent>
 </p:sld>
 </file>
 
@@ -8207,18 +8287,21 @@
             </a:schemeClr>
           </a:solidFill>
           <a:prstDash val="solid"/>
+          <a:miter/>
         </a:ln>
         <a:ln w="25400" cap="flat" cmpd="sng" algn="ctr">
           <a:solidFill>
             <a:schemeClr val="phClr"/>
           </a:solidFill>
           <a:prstDash val="solid"/>
+          <a:miter/>
         </a:ln>
         <a:ln w="38100" cap="flat" cmpd="sng" algn="ctr">
           <a:solidFill>
             <a:schemeClr val="phClr"/>
           </a:solidFill>
           <a:prstDash val="solid"/>
+          <a:miter/>
         </a:ln>
       </a:lnStyleLst>
       <a:effectStyleLst>
@@ -8430,18 +8513,21 @@
             </a:schemeClr>
           </a:solidFill>
           <a:prstDash val="solid"/>
+          <a:miter/>
         </a:ln>
         <a:ln w="25400" cap="flat" cmpd="sng" algn="ctr">
           <a:solidFill>
             <a:schemeClr val="phClr"/>
           </a:solidFill>
           <a:prstDash val="solid"/>
+          <a:miter/>
         </a:ln>
         <a:ln w="38100" cap="flat" cmpd="sng" algn="ctr">
           <a:solidFill>
             <a:schemeClr val="phClr"/>
           </a:solidFill>
           <a:prstDash val="solid"/>
+          <a:miter/>
         </a:ln>
       </a:lnStyleLst>
       <a:effectStyleLst>
@@ -8653,18 +8739,21 @@
             </a:schemeClr>
           </a:solidFill>
           <a:prstDash val="solid"/>
+          <a:miter/>
         </a:ln>
         <a:ln w="25400" cap="flat" cmpd="sng" algn="ctr">
           <a:solidFill>
             <a:schemeClr val="phClr"/>
           </a:solidFill>
           <a:prstDash val="solid"/>
+          <a:miter/>
         </a:ln>
         <a:ln w="38100" cap="flat" cmpd="sng" algn="ctr">
           <a:solidFill>
             <a:schemeClr val="phClr"/>
           </a:solidFill>
           <a:prstDash val="solid"/>
+          <a:miter/>
         </a:ln>
       </a:lnStyleLst>
       <a:effectStyleLst>

</xml_diff>